<commit_message>
update notebook neural netwrok and slides in presentation
</commit_message>
<xml_diff>
--- a/notebooks/KeyfeaturesOverview2021.pptx
+++ b/notebooks/KeyfeaturesOverview2021.pptx
@@ -3248,7 +3248,15 @@
           </a:pPr>
           <a:r>
             <a:rPr lang="en-US" sz="2400" dirty="0"/>
-            <a:t>Julia has over 4000 registered packages. They are a substantial part of the Julia ecosystem.</a:t>
+            <a:t>Julia has </a:t>
+          </a:r>
+          <a:r>
+            <a:rPr lang="en-US" sz="2400"/>
+            <a:t>over 6500 </a:t>
+          </a:r>
+          <a:r>
+            <a:rPr lang="en-US" sz="2400" dirty="0"/>
+            <a:t>registered packages. They are a substantial part of the Julia ecosystem.</a:t>
           </a:r>
           <a:br>
             <a:rPr lang="en-US" sz="2600" dirty="0"/>
@@ -4488,7 +4496,15 @@
           </a:pPr>
           <a:r>
             <a:rPr lang="en-US" sz="2400" kern="1200" dirty="0"/>
-            <a:t>Julia has over 4000 registered packages. They are a substantial part of the Julia ecosystem.</a:t>
+            <a:t>Julia has </a:t>
+          </a:r>
+          <a:r>
+            <a:rPr lang="en-US" sz="2400" kern="1200"/>
+            <a:t>over 6500 </a:t>
+          </a:r>
+          <a:r>
+            <a:rPr lang="en-US" sz="2400" kern="1200" dirty="0"/>
+            <a:t>registered packages. They are a substantial part of the Julia ecosystem.</a:t>
           </a:r>
           <a:br>
             <a:rPr lang="en-US" sz="2600" kern="1200" dirty="0"/>
@@ -9417,7 +9433,7 @@
           <a:p>
             <a:fld id="{34B4E5CE-5693-45B2-9F4A-467B690056A3}" type="datetimeFigureOut">
               <a:rPr lang="en-US" smtClean="0"/>
-              <a:t>11/3/2021</a:t>
+              <a:t>11/8/2021</a:t>
             </a:fld>
             <a:endParaRPr lang="en-US"/>
           </a:p>
@@ -9615,7 +9631,7 @@
           <a:p>
             <a:fld id="{34B4E5CE-5693-45B2-9F4A-467B690056A3}" type="datetimeFigureOut">
               <a:rPr lang="en-US" smtClean="0"/>
-              <a:t>11/3/2021</a:t>
+              <a:t>11/8/2021</a:t>
             </a:fld>
             <a:endParaRPr lang="en-US"/>
           </a:p>
@@ -9823,7 +9839,7 @@
           <a:p>
             <a:fld id="{34B4E5CE-5693-45B2-9F4A-467B690056A3}" type="datetimeFigureOut">
               <a:rPr lang="en-US" smtClean="0"/>
-              <a:t>11/3/2021</a:t>
+              <a:t>11/8/2021</a:t>
             </a:fld>
             <a:endParaRPr lang="en-US"/>
           </a:p>
@@ -10021,7 +10037,7 @@
           <a:p>
             <a:fld id="{34B4E5CE-5693-45B2-9F4A-467B690056A3}" type="datetimeFigureOut">
               <a:rPr lang="en-US" smtClean="0"/>
-              <a:t>11/3/2021</a:t>
+              <a:t>11/8/2021</a:t>
             </a:fld>
             <a:endParaRPr lang="en-US"/>
           </a:p>
@@ -10296,7 +10312,7 @@
           <a:p>
             <a:fld id="{34B4E5CE-5693-45B2-9F4A-467B690056A3}" type="datetimeFigureOut">
               <a:rPr lang="en-US" smtClean="0"/>
-              <a:t>11/3/2021</a:t>
+              <a:t>11/8/2021</a:t>
             </a:fld>
             <a:endParaRPr lang="en-US"/>
           </a:p>
@@ -10561,7 +10577,7 @@
           <a:p>
             <a:fld id="{34B4E5CE-5693-45B2-9F4A-467B690056A3}" type="datetimeFigureOut">
               <a:rPr lang="en-US" smtClean="0"/>
-              <a:t>11/3/2021</a:t>
+              <a:t>11/8/2021</a:t>
             </a:fld>
             <a:endParaRPr lang="en-US"/>
           </a:p>
@@ -10973,7 +10989,7 @@
           <a:p>
             <a:fld id="{34B4E5CE-5693-45B2-9F4A-467B690056A3}" type="datetimeFigureOut">
               <a:rPr lang="en-US" smtClean="0"/>
-              <a:t>11/3/2021</a:t>
+              <a:t>11/8/2021</a:t>
             </a:fld>
             <a:endParaRPr lang="en-US"/>
           </a:p>
@@ -11114,7 +11130,7 @@
           <a:p>
             <a:fld id="{34B4E5CE-5693-45B2-9F4A-467B690056A3}" type="datetimeFigureOut">
               <a:rPr lang="en-US" smtClean="0"/>
-              <a:t>11/3/2021</a:t>
+              <a:t>11/8/2021</a:t>
             </a:fld>
             <a:endParaRPr lang="en-US"/>
           </a:p>
@@ -11227,7 +11243,7 @@
           <a:p>
             <a:fld id="{34B4E5CE-5693-45B2-9F4A-467B690056A3}" type="datetimeFigureOut">
               <a:rPr lang="en-US" smtClean="0"/>
-              <a:t>11/3/2021</a:t>
+              <a:t>11/8/2021</a:t>
             </a:fld>
             <a:endParaRPr lang="en-US"/>
           </a:p>
@@ -11538,7 +11554,7 @@
           <a:p>
             <a:fld id="{34B4E5CE-5693-45B2-9F4A-467B690056A3}" type="datetimeFigureOut">
               <a:rPr lang="en-US" smtClean="0"/>
-              <a:t>11/3/2021</a:t>
+              <a:t>11/8/2021</a:t>
             </a:fld>
             <a:endParaRPr lang="en-US"/>
           </a:p>
@@ -11826,7 +11842,7 @@
           <a:p>
             <a:fld id="{34B4E5CE-5693-45B2-9F4A-467B690056A3}" type="datetimeFigureOut">
               <a:rPr lang="en-US" smtClean="0"/>
-              <a:t>11/3/2021</a:t>
+              <a:t>11/8/2021</a:t>
             </a:fld>
             <a:endParaRPr lang="en-US"/>
           </a:p>
@@ -12067,7 +12083,7 @@
           <a:p>
             <a:fld id="{34B4E5CE-5693-45B2-9F4A-467B690056A3}" type="datetimeFigureOut">
               <a:rPr lang="en-US" smtClean="0"/>
-              <a:t>11/3/2021</a:t>
+              <a:t>11/8/2021</a:t>
             </a:fld>
             <a:endParaRPr lang="en-US"/>
           </a:p>
@@ -24678,7 +24694,7 @@
             <p:ph idx="1"/>
             <p:extLst>
               <p:ext uri="{D42A27DB-BD31-4B8C-83A1-F6EECF244321}">
-                <p14:modId xmlns:p14="http://schemas.microsoft.com/office/powerpoint/2010/main" val="860063042"/>
+                <p14:modId xmlns:p14="http://schemas.microsoft.com/office/powerpoint/2010/main" val="3993859950"/>
               </p:ext>
             </p:extLst>
           </p:nvPr>

</xml_diff>

<commit_message>
update notebooks presenation 2021
</commit_message>
<xml_diff>
--- a/notebooks/KeyfeaturesOverview2021.pptx
+++ b/notebooks/KeyfeaturesOverview2021.pptx
@@ -16,8 +16,6 @@
     <p:sldId id="266" r:id="rId10"/>
     <p:sldId id="264" r:id="rId11"/>
     <p:sldId id="267" r:id="rId12"/>
-    <p:sldId id="290" r:id="rId13"/>
-    <p:sldId id="292" r:id="rId14"/>
   </p:sldIdLst>
   <p:sldSz cx="12192000" cy="6858000"/>
   <p:notesSz cx="6858000" cy="9144000"/>
@@ -2864,813 +2862,6 @@
     <dgm:fillClrLst meth="repeat">
       <a:schemeClr val="accent2">
         <a:tint val="40000"/>
-      </a:schemeClr>
-    </dgm:fillClrLst>
-    <dgm:linClrLst meth="repeat">
-      <a:schemeClr val="lt1"/>
-    </dgm:linClrLst>
-    <dgm:effectClrLst/>
-    <dgm:txLinClrLst/>
-    <dgm:txFillClrLst meth="repeat">
-      <a:schemeClr val="dk1"/>
-    </dgm:txFillClrLst>
-    <dgm:txEffectClrLst/>
-  </dgm:styleLbl>
-  <dgm:styleLbl name="revTx">
-    <dgm:fillClrLst meth="repeat">
-      <a:schemeClr val="lt1">
-        <a:alpha val="0"/>
-      </a:schemeClr>
-    </dgm:fillClrLst>
-    <dgm:linClrLst meth="repeat">
-      <a:schemeClr val="dk1">
-        <a:alpha val="0"/>
-      </a:schemeClr>
-    </dgm:linClrLst>
-    <dgm:effectClrLst/>
-    <dgm:txLinClrLst/>
-    <dgm:txFillClrLst meth="repeat">
-      <a:schemeClr val="tx1"/>
-    </dgm:txFillClrLst>
-    <dgm:txEffectClrLst/>
-  </dgm:styleLbl>
-</dgm:colorsDef>
-</file>
-
-<file path=ppt/diagrams/colors4.xml><?xml version="1.0" encoding="utf-8"?>
-<dgm:colorsDef xmlns:dgm="http://schemas.openxmlformats.org/drawingml/2006/diagram" xmlns:a="http://schemas.openxmlformats.org/drawingml/2006/main" uniqueId="urn:microsoft.com/office/officeart/2005/8/colors/accent0_1">
-  <dgm:title val=""/>
-  <dgm:desc val=""/>
-  <dgm:catLst>
-    <dgm:cat type="mainScheme" pri="10100"/>
-  </dgm:catLst>
-  <dgm:styleLbl name="node0">
-    <dgm:fillClrLst meth="repeat">
-      <a:schemeClr val="lt1"/>
-    </dgm:fillClrLst>
-    <dgm:linClrLst meth="repeat">
-      <a:schemeClr val="dk1">
-        <a:shade val="80000"/>
-      </a:schemeClr>
-    </dgm:linClrLst>
-    <dgm:effectClrLst/>
-    <dgm:txLinClrLst/>
-    <dgm:txFillClrLst meth="repeat">
-      <a:schemeClr val="dk1"/>
-    </dgm:txFillClrLst>
-    <dgm:txEffectClrLst/>
-  </dgm:styleLbl>
-  <dgm:styleLbl name="node1">
-    <dgm:fillClrLst meth="repeat">
-      <a:schemeClr val="lt1"/>
-    </dgm:fillClrLst>
-    <dgm:linClrLst meth="repeat">
-      <a:schemeClr val="dk1">
-        <a:shade val="80000"/>
-      </a:schemeClr>
-    </dgm:linClrLst>
-    <dgm:effectClrLst/>
-    <dgm:txLinClrLst/>
-    <dgm:txFillClrLst meth="repeat">
-      <a:schemeClr val="dk1"/>
-    </dgm:txFillClrLst>
-    <dgm:txEffectClrLst/>
-  </dgm:styleLbl>
-  <dgm:styleLbl name="alignNode1">
-    <dgm:fillClrLst meth="repeat">
-      <a:schemeClr val="lt1"/>
-    </dgm:fillClrLst>
-    <dgm:linClrLst meth="repeat">
-      <a:schemeClr val="dk1">
-        <a:shade val="80000"/>
-      </a:schemeClr>
-    </dgm:linClrLst>
-    <dgm:effectClrLst/>
-    <dgm:txLinClrLst/>
-    <dgm:txFillClrLst meth="repeat">
-      <a:schemeClr val="dk1"/>
-    </dgm:txFillClrLst>
-    <dgm:txEffectClrLst/>
-  </dgm:styleLbl>
-  <dgm:styleLbl name="lnNode1">
-    <dgm:fillClrLst meth="repeat">
-      <a:schemeClr val="lt1"/>
-    </dgm:fillClrLst>
-    <dgm:linClrLst meth="repeat">
-      <a:schemeClr val="dk1">
-        <a:shade val="80000"/>
-      </a:schemeClr>
-    </dgm:linClrLst>
-    <dgm:effectClrLst/>
-    <dgm:txLinClrLst/>
-    <dgm:txFillClrLst meth="repeat">
-      <a:schemeClr val="dk1"/>
-    </dgm:txFillClrLst>
-    <dgm:txEffectClrLst/>
-  </dgm:styleLbl>
-  <dgm:styleLbl name="vennNode1">
-    <dgm:fillClrLst meth="repeat">
-      <a:schemeClr val="lt1">
-        <a:alpha val="50000"/>
-      </a:schemeClr>
-    </dgm:fillClrLst>
-    <dgm:linClrLst meth="repeat">
-      <a:schemeClr val="dk1">
-        <a:shade val="80000"/>
-      </a:schemeClr>
-    </dgm:linClrLst>
-    <dgm:effectClrLst/>
-    <dgm:txLinClrLst/>
-    <dgm:txFillClrLst/>
-    <dgm:txEffectClrLst/>
-  </dgm:styleLbl>
-  <dgm:styleLbl name="node2">
-    <dgm:fillClrLst meth="repeat">
-      <a:schemeClr val="lt1"/>
-    </dgm:fillClrLst>
-    <dgm:linClrLst meth="repeat">
-      <a:schemeClr val="dk1">
-        <a:shade val="80000"/>
-      </a:schemeClr>
-    </dgm:linClrLst>
-    <dgm:effectClrLst/>
-    <dgm:txLinClrLst/>
-    <dgm:txFillClrLst meth="repeat">
-      <a:schemeClr val="dk1"/>
-    </dgm:txFillClrLst>
-    <dgm:txEffectClrLst/>
-  </dgm:styleLbl>
-  <dgm:styleLbl name="node3">
-    <dgm:fillClrLst meth="repeat">
-      <a:schemeClr val="lt1"/>
-    </dgm:fillClrLst>
-    <dgm:linClrLst meth="repeat">
-      <a:schemeClr val="dk1">
-        <a:shade val="80000"/>
-      </a:schemeClr>
-    </dgm:linClrLst>
-    <dgm:effectClrLst/>
-    <dgm:txLinClrLst/>
-    <dgm:txFillClrLst meth="repeat">
-      <a:schemeClr val="dk1"/>
-    </dgm:txFillClrLst>
-    <dgm:txEffectClrLst/>
-  </dgm:styleLbl>
-  <dgm:styleLbl name="node4">
-    <dgm:fillClrLst meth="repeat">
-      <a:schemeClr val="lt1"/>
-    </dgm:fillClrLst>
-    <dgm:linClrLst meth="repeat">
-      <a:schemeClr val="dk1">
-        <a:shade val="80000"/>
-      </a:schemeClr>
-    </dgm:linClrLst>
-    <dgm:effectClrLst/>
-    <dgm:txLinClrLst/>
-    <dgm:txFillClrLst meth="repeat">
-      <a:schemeClr val="dk1"/>
-    </dgm:txFillClrLst>
-    <dgm:txEffectClrLst/>
-  </dgm:styleLbl>
-  <dgm:styleLbl name="fgImgPlace1">
-    <dgm:fillClrLst meth="repeat">
-      <a:schemeClr val="dk1">
-        <a:tint val="40000"/>
-      </a:schemeClr>
-    </dgm:fillClrLst>
-    <dgm:linClrLst meth="repeat">
-      <a:schemeClr val="dk1">
-        <a:shade val="80000"/>
-      </a:schemeClr>
-    </dgm:linClrLst>
-    <dgm:effectClrLst/>
-    <dgm:txLinClrLst/>
-    <dgm:txFillClrLst meth="repeat">
-      <a:schemeClr val="lt1"/>
-    </dgm:txFillClrLst>
-    <dgm:txEffectClrLst/>
-  </dgm:styleLbl>
-  <dgm:styleLbl name="alignImgPlace1">
-    <dgm:fillClrLst meth="repeat">
-      <a:schemeClr val="dk1">
-        <a:tint val="40000"/>
-      </a:schemeClr>
-    </dgm:fillClrLst>
-    <dgm:linClrLst meth="repeat">
-      <a:schemeClr val="dk1">
-        <a:shade val="80000"/>
-      </a:schemeClr>
-    </dgm:linClrLst>
-    <dgm:effectClrLst/>
-    <dgm:txLinClrLst/>
-    <dgm:txFillClrLst meth="repeat">
-      <a:schemeClr val="lt1"/>
-    </dgm:txFillClrLst>
-    <dgm:txEffectClrLst/>
-  </dgm:styleLbl>
-  <dgm:styleLbl name="bgImgPlace1">
-    <dgm:fillClrLst meth="repeat">
-      <a:schemeClr val="dk1">
-        <a:tint val="40000"/>
-      </a:schemeClr>
-    </dgm:fillClrLst>
-    <dgm:linClrLst meth="repeat">
-      <a:schemeClr val="dk1">
-        <a:shade val="80000"/>
-      </a:schemeClr>
-    </dgm:linClrLst>
-    <dgm:effectClrLst/>
-    <dgm:txLinClrLst/>
-    <dgm:txFillClrLst meth="repeat">
-      <a:schemeClr val="lt1"/>
-    </dgm:txFillClrLst>
-    <dgm:txEffectClrLst/>
-  </dgm:styleLbl>
-  <dgm:styleLbl name="sibTrans2D1">
-    <dgm:fillClrLst meth="repeat">
-      <a:schemeClr val="dk1">
-        <a:tint val="60000"/>
-      </a:schemeClr>
-    </dgm:fillClrLst>
-    <dgm:linClrLst meth="repeat">
-      <a:schemeClr val="dk1">
-        <a:tint val="60000"/>
-      </a:schemeClr>
-    </dgm:linClrLst>
-    <dgm:effectClrLst/>
-    <dgm:txLinClrLst/>
-    <dgm:txFillClrLst meth="repeat">
-      <a:schemeClr val="dk1"/>
-    </dgm:txFillClrLst>
-    <dgm:txEffectClrLst/>
-  </dgm:styleLbl>
-  <dgm:styleLbl name="fgSibTrans2D1">
-    <dgm:fillClrLst meth="repeat">
-      <a:schemeClr val="dk1">
-        <a:tint val="60000"/>
-      </a:schemeClr>
-    </dgm:fillClrLst>
-    <dgm:linClrLst meth="repeat">
-      <a:schemeClr val="dk1">
-        <a:tint val="60000"/>
-      </a:schemeClr>
-    </dgm:linClrLst>
-    <dgm:effectClrLst/>
-    <dgm:txLinClrLst/>
-    <dgm:txFillClrLst meth="repeat">
-      <a:schemeClr val="dk1"/>
-    </dgm:txFillClrLst>
-    <dgm:txEffectClrLst/>
-  </dgm:styleLbl>
-  <dgm:styleLbl name="bgSibTrans2D1">
-    <dgm:fillClrLst meth="repeat">
-      <a:schemeClr val="dk1">
-        <a:tint val="60000"/>
-      </a:schemeClr>
-    </dgm:fillClrLst>
-    <dgm:linClrLst meth="repeat">
-      <a:schemeClr val="dk1">
-        <a:tint val="60000"/>
-      </a:schemeClr>
-    </dgm:linClrLst>
-    <dgm:effectClrLst/>
-    <dgm:txLinClrLst/>
-    <dgm:txFillClrLst meth="repeat">
-      <a:schemeClr val="dk1"/>
-    </dgm:txFillClrLst>
-    <dgm:txEffectClrLst/>
-  </dgm:styleLbl>
-  <dgm:styleLbl name="sibTrans1D1">
-    <dgm:fillClrLst meth="repeat">
-      <a:schemeClr val="dk1"/>
-    </dgm:fillClrLst>
-    <dgm:linClrLst meth="repeat">
-      <a:schemeClr val="dk1"/>
-    </dgm:linClrLst>
-    <dgm:effectClrLst/>
-    <dgm:txLinClrLst/>
-    <dgm:txFillClrLst meth="repeat">
-      <a:schemeClr val="tx1"/>
-    </dgm:txFillClrLst>
-    <dgm:txEffectClrLst/>
-  </dgm:styleLbl>
-  <dgm:styleLbl name="callout">
-    <dgm:fillClrLst meth="repeat">
-      <a:schemeClr val="dk1"/>
-    </dgm:fillClrLst>
-    <dgm:linClrLst meth="repeat">
-      <a:schemeClr val="dk1"/>
-    </dgm:linClrLst>
-    <dgm:effectClrLst/>
-    <dgm:txLinClrLst/>
-    <dgm:txFillClrLst meth="repeat">
-      <a:schemeClr val="tx1"/>
-    </dgm:txFillClrLst>
-    <dgm:txEffectClrLst/>
-  </dgm:styleLbl>
-  <dgm:styleLbl name="asst0">
-    <dgm:fillClrLst meth="repeat">
-      <a:schemeClr val="lt1"/>
-    </dgm:fillClrLst>
-    <dgm:linClrLst meth="repeat">
-      <a:schemeClr val="dk1">
-        <a:shade val="80000"/>
-      </a:schemeClr>
-    </dgm:linClrLst>
-    <dgm:effectClrLst/>
-    <dgm:txLinClrLst/>
-    <dgm:txFillClrLst meth="repeat">
-      <a:schemeClr val="dk1"/>
-    </dgm:txFillClrLst>
-    <dgm:txEffectClrLst/>
-  </dgm:styleLbl>
-  <dgm:styleLbl name="asst1">
-    <dgm:fillClrLst meth="repeat">
-      <a:schemeClr val="lt1"/>
-    </dgm:fillClrLst>
-    <dgm:linClrLst meth="repeat">
-      <a:schemeClr val="dk1">
-        <a:shade val="80000"/>
-      </a:schemeClr>
-    </dgm:linClrLst>
-    <dgm:effectClrLst/>
-    <dgm:txLinClrLst/>
-    <dgm:txFillClrLst meth="repeat">
-      <a:schemeClr val="dk1"/>
-    </dgm:txFillClrLst>
-    <dgm:txEffectClrLst/>
-  </dgm:styleLbl>
-  <dgm:styleLbl name="asst2">
-    <dgm:fillClrLst meth="repeat">
-      <a:schemeClr val="lt1"/>
-    </dgm:fillClrLst>
-    <dgm:linClrLst meth="repeat">
-      <a:schemeClr val="dk1">
-        <a:shade val="80000"/>
-      </a:schemeClr>
-    </dgm:linClrLst>
-    <dgm:effectClrLst/>
-    <dgm:txLinClrLst/>
-    <dgm:txFillClrLst meth="repeat">
-      <a:schemeClr val="dk1"/>
-    </dgm:txFillClrLst>
-    <dgm:txEffectClrLst/>
-  </dgm:styleLbl>
-  <dgm:styleLbl name="asst3">
-    <dgm:fillClrLst meth="repeat">
-      <a:schemeClr val="lt1"/>
-    </dgm:fillClrLst>
-    <dgm:linClrLst meth="repeat">
-      <a:schemeClr val="dk1">
-        <a:shade val="80000"/>
-      </a:schemeClr>
-    </dgm:linClrLst>
-    <dgm:effectClrLst/>
-    <dgm:txLinClrLst/>
-    <dgm:txFillClrLst meth="repeat">
-      <a:schemeClr val="dk1"/>
-    </dgm:txFillClrLst>
-    <dgm:txEffectClrLst/>
-  </dgm:styleLbl>
-  <dgm:styleLbl name="asst4">
-    <dgm:fillClrLst meth="repeat">
-      <a:schemeClr val="lt1"/>
-    </dgm:fillClrLst>
-    <dgm:linClrLst meth="repeat">
-      <a:schemeClr val="dk1">
-        <a:shade val="80000"/>
-      </a:schemeClr>
-    </dgm:linClrLst>
-    <dgm:effectClrLst/>
-    <dgm:txLinClrLst/>
-    <dgm:txFillClrLst meth="repeat">
-      <a:schemeClr val="dk1"/>
-    </dgm:txFillClrLst>
-    <dgm:txEffectClrLst/>
-  </dgm:styleLbl>
-  <dgm:styleLbl name="parChTrans2D1">
-    <dgm:fillClrLst meth="repeat">
-      <a:schemeClr val="dk1">
-        <a:tint val="60000"/>
-      </a:schemeClr>
-    </dgm:fillClrLst>
-    <dgm:linClrLst meth="repeat">
-      <a:schemeClr val="dk1">
-        <a:tint val="60000"/>
-      </a:schemeClr>
-    </dgm:linClrLst>
-    <dgm:effectClrLst/>
-    <dgm:txLinClrLst/>
-    <dgm:txFillClrLst/>
-    <dgm:txEffectClrLst/>
-  </dgm:styleLbl>
-  <dgm:styleLbl name="parChTrans2D2">
-    <dgm:fillClrLst meth="repeat">
-      <a:schemeClr val="dk1"/>
-    </dgm:fillClrLst>
-    <dgm:linClrLst meth="repeat">
-      <a:schemeClr val="dk1"/>
-    </dgm:linClrLst>
-    <dgm:effectClrLst/>
-    <dgm:txLinClrLst/>
-    <dgm:txFillClrLst/>
-    <dgm:txEffectClrLst/>
-  </dgm:styleLbl>
-  <dgm:styleLbl name="parChTrans2D3">
-    <dgm:fillClrLst meth="repeat">
-      <a:schemeClr val="dk1"/>
-    </dgm:fillClrLst>
-    <dgm:linClrLst meth="repeat">
-      <a:schemeClr val="dk1"/>
-    </dgm:linClrLst>
-    <dgm:effectClrLst/>
-    <dgm:txLinClrLst/>
-    <dgm:txFillClrLst/>
-    <dgm:txEffectClrLst/>
-  </dgm:styleLbl>
-  <dgm:styleLbl name="parChTrans2D4">
-    <dgm:fillClrLst meth="repeat">
-      <a:schemeClr val="dk1"/>
-    </dgm:fillClrLst>
-    <dgm:linClrLst meth="repeat">
-      <a:schemeClr val="dk1"/>
-    </dgm:linClrLst>
-    <dgm:effectClrLst/>
-    <dgm:txLinClrLst/>
-    <dgm:txFillClrLst meth="repeat">
-      <a:schemeClr val="lt1"/>
-    </dgm:txFillClrLst>
-    <dgm:txEffectClrLst/>
-  </dgm:styleLbl>
-  <dgm:styleLbl name="parChTrans1D1">
-    <dgm:fillClrLst meth="repeat">
-      <a:schemeClr val="dk1"/>
-    </dgm:fillClrLst>
-    <dgm:linClrLst meth="repeat">
-      <a:schemeClr val="dk1">
-        <a:shade val="60000"/>
-      </a:schemeClr>
-    </dgm:linClrLst>
-    <dgm:effectClrLst/>
-    <dgm:txLinClrLst/>
-    <dgm:txFillClrLst meth="repeat">
-      <a:schemeClr val="tx1"/>
-    </dgm:txFillClrLst>
-    <dgm:txEffectClrLst/>
-  </dgm:styleLbl>
-  <dgm:styleLbl name="parChTrans1D2">
-    <dgm:fillClrLst meth="repeat">
-      <a:schemeClr val="dk1"/>
-    </dgm:fillClrLst>
-    <dgm:linClrLst meth="repeat">
-      <a:schemeClr val="dk1">
-        <a:shade val="60000"/>
-      </a:schemeClr>
-    </dgm:linClrLst>
-    <dgm:effectClrLst/>
-    <dgm:txLinClrLst/>
-    <dgm:txFillClrLst meth="repeat">
-      <a:schemeClr val="tx1"/>
-    </dgm:txFillClrLst>
-    <dgm:txEffectClrLst/>
-  </dgm:styleLbl>
-  <dgm:styleLbl name="parChTrans1D3">
-    <dgm:fillClrLst meth="repeat">
-      <a:schemeClr val="dk1"/>
-    </dgm:fillClrLst>
-    <dgm:linClrLst meth="repeat">
-      <a:schemeClr val="dk1">
-        <a:shade val="80000"/>
-      </a:schemeClr>
-    </dgm:linClrLst>
-    <dgm:effectClrLst/>
-    <dgm:txLinClrLst/>
-    <dgm:txFillClrLst meth="repeat">
-      <a:schemeClr val="tx1"/>
-    </dgm:txFillClrLst>
-    <dgm:txEffectClrLst/>
-  </dgm:styleLbl>
-  <dgm:styleLbl name="parChTrans1D4">
-    <dgm:fillClrLst meth="repeat">
-      <a:schemeClr val="dk1"/>
-    </dgm:fillClrLst>
-    <dgm:linClrLst meth="repeat">
-      <a:schemeClr val="dk1">
-        <a:shade val="80000"/>
-      </a:schemeClr>
-    </dgm:linClrLst>
-    <dgm:effectClrLst/>
-    <dgm:txLinClrLst/>
-    <dgm:txFillClrLst meth="repeat">
-      <a:schemeClr val="tx1"/>
-    </dgm:txFillClrLst>
-    <dgm:txEffectClrLst/>
-  </dgm:styleLbl>
-  <dgm:styleLbl name="fgAcc1">
-    <dgm:fillClrLst meth="repeat">
-      <a:schemeClr val="dk1">
-        <a:alpha val="90000"/>
-        <a:tint val="40000"/>
-      </a:schemeClr>
-    </dgm:fillClrLst>
-    <dgm:linClrLst meth="repeat">
-      <a:schemeClr val="dk1"/>
-    </dgm:linClrLst>
-    <dgm:effectClrLst/>
-    <dgm:txLinClrLst/>
-    <dgm:txFillClrLst meth="repeat">
-      <a:schemeClr val="dk1"/>
-    </dgm:txFillClrLst>
-    <dgm:txEffectClrLst/>
-  </dgm:styleLbl>
-  <dgm:styleLbl name="conFgAcc1">
-    <dgm:fillClrLst meth="repeat">
-      <a:schemeClr val="dk1">
-        <a:alpha val="90000"/>
-        <a:tint val="40000"/>
-      </a:schemeClr>
-    </dgm:fillClrLst>
-    <dgm:linClrLst meth="repeat">
-      <a:schemeClr val="dk1"/>
-    </dgm:linClrLst>
-    <dgm:effectClrLst/>
-    <dgm:txLinClrLst/>
-    <dgm:txFillClrLst meth="repeat">
-      <a:schemeClr val="dk1"/>
-    </dgm:txFillClrLst>
-    <dgm:txEffectClrLst/>
-  </dgm:styleLbl>
-  <dgm:styleLbl name="alignAcc1">
-    <dgm:fillClrLst meth="repeat">
-      <a:schemeClr val="dk1">
-        <a:alpha val="90000"/>
-        <a:tint val="40000"/>
-      </a:schemeClr>
-    </dgm:fillClrLst>
-    <dgm:linClrLst meth="repeat">
-      <a:schemeClr val="dk1"/>
-    </dgm:linClrLst>
-    <dgm:effectClrLst/>
-    <dgm:txLinClrLst/>
-    <dgm:txFillClrLst meth="repeat">
-      <a:schemeClr val="dk1"/>
-    </dgm:txFillClrLst>
-    <dgm:txEffectClrLst/>
-  </dgm:styleLbl>
-  <dgm:styleLbl name="trAlignAcc1">
-    <dgm:fillClrLst meth="repeat">
-      <a:schemeClr val="dk1">
-        <a:alpha val="40000"/>
-        <a:tint val="40000"/>
-      </a:schemeClr>
-    </dgm:fillClrLst>
-    <dgm:linClrLst meth="repeat">
-      <a:schemeClr val="dk1"/>
-    </dgm:linClrLst>
-    <dgm:effectClrLst/>
-    <dgm:txLinClrLst/>
-    <dgm:txFillClrLst meth="repeat">
-      <a:schemeClr val="dk1"/>
-    </dgm:txFillClrLst>
-    <dgm:txEffectClrLst/>
-  </dgm:styleLbl>
-  <dgm:styleLbl name="bgAcc1">
-    <dgm:fillClrLst meth="repeat">
-      <a:schemeClr val="dk1">
-        <a:alpha val="90000"/>
-        <a:tint val="40000"/>
-      </a:schemeClr>
-    </dgm:fillClrLst>
-    <dgm:linClrLst meth="repeat">
-      <a:schemeClr val="dk1"/>
-    </dgm:linClrLst>
-    <dgm:effectClrLst/>
-    <dgm:txLinClrLst/>
-    <dgm:txFillClrLst meth="repeat">
-      <a:schemeClr val="dk1"/>
-    </dgm:txFillClrLst>
-    <dgm:txEffectClrLst/>
-  </dgm:styleLbl>
-  <dgm:styleLbl name="solidFgAcc1">
-    <dgm:fillClrLst meth="repeat">
-      <a:schemeClr val="lt1"/>
-    </dgm:fillClrLst>
-    <dgm:linClrLst meth="repeat">
-      <a:schemeClr val="dk1"/>
-    </dgm:linClrLst>
-    <dgm:effectClrLst/>
-    <dgm:txLinClrLst/>
-    <dgm:txFillClrLst meth="repeat">
-      <a:schemeClr val="dk1"/>
-    </dgm:txFillClrLst>
-    <dgm:txEffectClrLst/>
-  </dgm:styleLbl>
-  <dgm:styleLbl name="solidAlignAcc1">
-    <dgm:fillClrLst meth="repeat">
-      <a:schemeClr val="lt1"/>
-    </dgm:fillClrLst>
-    <dgm:linClrLst meth="repeat">
-      <a:schemeClr val="dk1"/>
-    </dgm:linClrLst>
-    <dgm:effectClrLst/>
-    <dgm:txLinClrLst/>
-    <dgm:txFillClrLst meth="repeat">
-      <a:schemeClr val="dk1"/>
-    </dgm:txFillClrLst>
-    <dgm:txEffectClrLst/>
-  </dgm:styleLbl>
-  <dgm:styleLbl name="solidBgAcc1">
-    <dgm:fillClrLst meth="repeat">
-      <a:schemeClr val="lt1"/>
-    </dgm:fillClrLst>
-    <dgm:linClrLst meth="repeat">
-      <a:schemeClr val="dk1"/>
-    </dgm:linClrLst>
-    <dgm:effectClrLst/>
-    <dgm:txLinClrLst/>
-    <dgm:txFillClrLst meth="repeat">
-      <a:schemeClr val="dk1"/>
-    </dgm:txFillClrLst>
-    <dgm:txEffectClrLst/>
-  </dgm:styleLbl>
-  <dgm:styleLbl name="fgAccFollowNode1">
-    <dgm:fillClrLst meth="repeat">
-      <a:schemeClr val="lt1">
-        <a:alpha val="90000"/>
-        <a:tint val="40000"/>
-      </a:schemeClr>
-    </dgm:fillClrLst>
-    <dgm:linClrLst meth="repeat">
-      <a:schemeClr val="dk1">
-        <a:alpha val="90000"/>
-      </a:schemeClr>
-    </dgm:linClrLst>
-    <dgm:effectClrLst/>
-    <dgm:txLinClrLst/>
-    <dgm:txFillClrLst meth="repeat">
-      <a:schemeClr val="dk1"/>
-    </dgm:txFillClrLst>
-    <dgm:txEffectClrLst/>
-  </dgm:styleLbl>
-  <dgm:styleLbl name="alignAccFollowNode1">
-    <dgm:fillClrLst meth="repeat">
-      <a:schemeClr val="lt1">
-        <a:alpha val="90000"/>
-        <a:tint val="40000"/>
-      </a:schemeClr>
-    </dgm:fillClrLst>
-    <dgm:linClrLst meth="repeat">
-      <a:schemeClr val="dk1">
-        <a:alpha val="90000"/>
-      </a:schemeClr>
-    </dgm:linClrLst>
-    <dgm:effectClrLst/>
-    <dgm:txLinClrLst/>
-    <dgm:txFillClrLst meth="repeat">
-      <a:schemeClr val="dk1"/>
-    </dgm:txFillClrLst>
-    <dgm:txEffectClrLst/>
-  </dgm:styleLbl>
-  <dgm:styleLbl name="bgAccFollowNode1">
-    <dgm:fillClrLst meth="repeat">
-      <a:schemeClr val="lt1">
-        <a:alpha val="90000"/>
-        <a:tint val="40000"/>
-      </a:schemeClr>
-    </dgm:fillClrLst>
-    <dgm:linClrLst meth="repeat">
-      <a:schemeClr val="dk1">
-        <a:alpha val="90000"/>
-      </a:schemeClr>
-    </dgm:linClrLst>
-    <dgm:effectClrLst/>
-    <dgm:txLinClrLst/>
-    <dgm:txFillClrLst meth="repeat">
-      <a:schemeClr val="dk1"/>
-    </dgm:txFillClrLst>
-    <dgm:txEffectClrLst/>
-  </dgm:styleLbl>
-  <dgm:styleLbl name="fgAcc0">
-    <dgm:fillClrLst meth="repeat">
-      <a:schemeClr val="dk1">
-        <a:alpha val="90000"/>
-        <a:tint val="40000"/>
-      </a:schemeClr>
-    </dgm:fillClrLst>
-    <dgm:linClrLst meth="repeat">
-      <a:schemeClr val="dk1"/>
-    </dgm:linClrLst>
-    <dgm:effectClrLst/>
-    <dgm:txLinClrLst/>
-    <dgm:txFillClrLst meth="repeat">
-      <a:schemeClr val="dk1"/>
-    </dgm:txFillClrLst>
-    <dgm:txEffectClrLst/>
-  </dgm:styleLbl>
-  <dgm:styleLbl name="fgAcc2">
-    <dgm:fillClrLst meth="repeat">
-      <a:schemeClr val="dk1">
-        <a:alpha val="90000"/>
-        <a:tint val="40000"/>
-      </a:schemeClr>
-    </dgm:fillClrLst>
-    <dgm:linClrLst meth="repeat">
-      <a:schemeClr val="dk1"/>
-    </dgm:linClrLst>
-    <dgm:effectClrLst/>
-    <dgm:txLinClrLst/>
-    <dgm:txFillClrLst meth="repeat">
-      <a:schemeClr val="dk1"/>
-    </dgm:txFillClrLst>
-    <dgm:txEffectClrLst/>
-  </dgm:styleLbl>
-  <dgm:styleLbl name="fgAcc3">
-    <dgm:fillClrLst meth="repeat">
-      <a:schemeClr val="dk1">
-        <a:alpha val="90000"/>
-        <a:tint val="40000"/>
-      </a:schemeClr>
-    </dgm:fillClrLst>
-    <dgm:linClrLst meth="repeat">
-      <a:schemeClr val="dk1"/>
-    </dgm:linClrLst>
-    <dgm:effectClrLst/>
-    <dgm:txLinClrLst/>
-    <dgm:txFillClrLst meth="repeat">
-      <a:schemeClr val="dk1"/>
-    </dgm:txFillClrLst>
-    <dgm:txEffectClrLst/>
-  </dgm:styleLbl>
-  <dgm:styleLbl name="fgAcc4">
-    <dgm:fillClrLst meth="repeat">
-      <a:schemeClr val="dk1">
-        <a:alpha val="90000"/>
-        <a:tint val="40000"/>
-      </a:schemeClr>
-    </dgm:fillClrLst>
-    <dgm:linClrLst meth="repeat">
-      <a:schemeClr val="dk1"/>
-    </dgm:linClrLst>
-    <dgm:effectClrLst/>
-    <dgm:txLinClrLst/>
-    <dgm:txFillClrLst meth="repeat">
-      <a:schemeClr val="dk1"/>
-    </dgm:txFillClrLst>
-    <dgm:txEffectClrLst/>
-  </dgm:styleLbl>
-  <dgm:styleLbl name="bgShp">
-    <dgm:fillClrLst meth="repeat">
-      <a:schemeClr val="dk1">
-        <a:tint val="40000"/>
-      </a:schemeClr>
-    </dgm:fillClrLst>
-    <dgm:linClrLst meth="repeat">
-      <a:schemeClr val="dk1"/>
-    </dgm:linClrLst>
-    <dgm:effectClrLst/>
-    <dgm:txLinClrLst/>
-    <dgm:txFillClrLst meth="repeat">
-      <a:schemeClr val="dk1"/>
-    </dgm:txFillClrLst>
-    <dgm:txEffectClrLst/>
-  </dgm:styleLbl>
-  <dgm:styleLbl name="dkBgShp">
-    <dgm:fillClrLst meth="repeat">
-      <a:schemeClr val="dk1">
-        <a:shade val="80000"/>
-      </a:schemeClr>
-    </dgm:fillClrLst>
-    <dgm:linClrLst meth="repeat">
-      <a:schemeClr val="dk1"/>
-    </dgm:linClrLst>
-    <dgm:effectClrLst/>
-    <dgm:txLinClrLst/>
-    <dgm:txFillClrLst meth="repeat">
-      <a:schemeClr val="lt1"/>
-    </dgm:txFillClrLst>
-    <dgm:txEffectClrLst/>
-  </dgm:styleLbl>
-  <dgm:styleLbl name="trBgShp">
-    <dgm:fillClrLst meth="repeat">
-      <a:schemeClr val="dk1">
-        <a:tint val="50000"/>
-        <a:alpha val="40000"/>
-      </a:schemeClr>
-    </dgm:fillClrLst>
-    <dgm:linClrLst meth="repeat">
-      <a:schemeClr val="dk1"/>
-    </dgm:linClrLst>
-    <dgm:effectClrLst/>
-    <dgm:txLinClrLst/>
-    <dgm:txFillClrLst meth="repeat">
-      <a:schemeClr val="lt1"/>
-    </dgm:txFillClrLst>
-    <dgm:txEffectClrLst/>
-  </dgm:styleLbl>
-  <dgm:styleLbl name="fgShp">
-    <dgm:fillClrLst meth="repeat">
-      <a:schemeClr val="dk1">
-        <a:tint val="60000"/>
       </a:schemeClr>
     </dgm:fillClrLst>
     <dgm:linClrLst meth="repeat">
@@ -4654,273 +3845,6 @@
     <dgm:cxn modelId="{FB03C994-D4A4-485A-978E-0B63C86D70E3}" type="presParOf" srcId="{EEB5ECC1-8609-4C03-8E29-C6749A3EFE51}" destId="{D85F164F-D121-489A-9D0F-00F7B8EE3EA0}" srcOrd="1" destOrd="0" presId="urn:microsoft.com/office/officeart/2018/2/layout/IconVerticalSolidList"/>
     <dgm:cxn modelId="{ED2CE96A-8306-447C-BC2A-F1703AAB2E0B}" type="presParOf" srcId="{EEB5ECC1-8609-4C03-8E29-C6749A3EFE51}" destId="{B41362F6-677D-43EC-BDC4-20E424E40F03}" srcOrd="2" destOrd="0" presId="urn:microsoft.com/office/officeart/2018/2/layout/IconVerticalSolidList"/>
     <dgm:cxn modelId="{4DF479D3-F52C-4A1A-B896-1AD9308CBD79}" type="presParOf" srcId="{EEB5ECC1-8609-4C03-8E29-C6749A3EFE51}" destId="{A45825CE-76A8-4092-8300-261F38D7A834}" srcOrd="3" destOrd="0" presId="urn:microsoft.com/office/officeart/2018/2/layout/IconVerticalSolidList"/>
-  </dgm:cxnLst>
-  <dgm:bg/>
-  <dgm:whole/>
-  <dgm:extLst>
-    <a:ext uri="http://schemas.microsoft.com/office/drawing/2008/diagram">
-      <dsp:dataModelExt xmlns:dsp="http://schemas.microsoft.com/office/drawing/2008/diagram" relId="rId6" minVer="http://schemas.openxmlformats.org/drawingml/2006/diagram"/>
-    </a:ext>
-  </dgm:extLst>
-</dgm:dataModel>
-</file>
-
-<file path=ppt/diagrams/data4.xml><?xml version="1.0" encoding="utf-8"?>
-<dgm:dataModel xmlns:dgm="http://schemas.openxmlformats.org/drawingml/2006/diagram" xmlns:a="http://schemas.openxmlformats.org/drawingml/2006/main">
-  <dgm:ptLst>
-    <dgm:pt modelId="{FA18C1CF-0133-4B05-81BD-EBE4742B5909}" type="doc">
-      <dgm:prSet loTypeId="urn:microsoft.com/office/officeart/2008/layout/LinedList" loCatId="list" qsTypeId="urn:microsoft.com/office/officeart/2005/8/quickstyle/simple1" qsCatId="simple" csTypeId="urn:microsoft.com/office/officeart/2005/8/colors/accent0_1" csCatId="mainScheme" phldr="1"/>
-      <dgm:spPr/>
-      <dgm:t>
-        <a:bodyPr/>
-        <a:lstStyle/>
-        <a:p>
-          <a:endParaRPr lang="en-US"/>
-        </a:p>
-      </dgm:t>
-    </dgm:pt>
-    <dgm:pt modelId="{F2B3F850-92BD-47BF-8540-6BA132756119}">
-      <dgm:prSet custT="1"/>
-      <dgm:spPr/>
-      <dgm:t>
-        <a:bodyPr/>
-        <a:lstStyle/>
-        <a:p>
-          <a:pPr>
-            <a:lnSpc>
-              <a:spcPct val="100000"/>
-            </a:lnSpc>
-          </a:pPr>
-          <a:r>
-            <a:rPr lang="en-US" sz="2400"/>
-            <a:t>Julia has over 6500 registered packages. They are a substantial part of the Julia ecosystem.</a:t>
-          </a:r>
-          <a:br>
-            <a:rPr lang="en-US" sz="2600"/>
-          </a:br>
-          <a:br>
-            <a:rPr lang="en-US" sz="2600"/>
-          </a:br>
-          <a:endParaRPr lang="en-US" sz="2600" dirty="0"/>
-        </a:p>
-      </dgm:t>
-    </dgm:pt>
-    <dgm:pt modelId="{B35A21EB-CC0F-433D-8912-DF61D154C278}" type="parTrans" cxnId="{A486ED7D-3567-4F7D-A3EF-3F42CAEAF9B0}">
-      <dgm:prSet/>
-      <dgm:spPr/>
-      <dgm:t>
-        <a:bodyPr/>
-        <a:lstStyle/>
-        <a:p>
-          <a:endParaRPr lang="en-US"/>
-        </a:p>
-      </dgm:t>
-    </dgm:pt>
-    <dgm:pt modelId="{3FCB08DB-B246-4C95-A892-3E8B66676D2E}" type="sibTrans" cxnId="{A486ED7D-3567-4F7D-A3EF-3F42CAEAF9B0}">
-      <dgm:prSet/>
-      <dgm:spPr/>
-      <dgm:t>
-        <a:bodyPr/>
-        <a:lstStyle/>
-        <a:p>
-          <a:endParaRPr lang="en-US"/>
-        </a:p>
-      </dgm:t>
-    </dgm:pt>
-    <dgm:pt modelId="{C3FF1B06-568E-4FB4-AAF0-AD4DA6B78AE8}">
-      <dgm:prSet custT="1"/>
-      <dgm:spPr/>
-      <dgm:t>
-        <a:bodyPr/>
-        <a:lstStyle/>
-        <a:p>
-          <a:pPr>
-            <a:lnSpc>
-              <a:spcPct val="100000"/>
-            </a:lnSpc>
-          </a:pPr>
-          <a:r>
-            <a:rPr lang="en-US" sz="2400"/>
-            <a:t>To explore existing packages related to your area of interest you can check out the following link: </a:t>
-          </a:r>
-          <a:r>
-            <a:rPr lang="en-US" sz="2400">
-              <a:hlinkClick xmlns:r="http://schemas.openxmlformats.org/officeDocument/2006/relationships" r:id="rId1"/>
-            </a:rPr>
-            <a:t>https://juliahub.com/ui/Packages</a:t>
-          </a:r>
-          <a:br>
-            <a:rPr lang="en-US" sz="2100"/>
-          </a:br>
-          <a:br>
-            <a:rPr lang="en-US" sz="2100"/>
-          </a:br>
-          <a:endParaRPr lang="en-US" sz="2100" dirty="0"/>
-        </a:p>
-      </dgm:t>
-    </dgm:pt>
-    <dgm:pt modelId="{40346FC3-2B86-435D-A600-E66505FC7847}" type="parTrans" cxnId="{2BF93C9A-43E3-4713-BB68-983BD35B3ABC}">
-      <dgm:prSet/>
-      <dgm:spPr/>
-      <dgm:t>
-        <a:bodyPr/>
-        <a:lstStyle/>
-        <a:p>
-          <a:endParaRPr lang="en-US"/>
-        </a:p>
-      </dgm:t>
-    </dgm:pt>
-    <dgm:pt modelId="{6B92CF39-8E56-4A65-A05D-5D0DBA604D72}" type="sibTrans" cxnId="{2BF93C9A-43E3-4713-BB68-983BD35B3ABC}">
-      <dgm:prSet/>
-      <dgm:spPr/>
-      <dgm:t>
-        <a:bodyPr/>
-        <a:lstStyle/>
-        <a:p>
-          <a:endParaRPr lang="en-US"/>
-        </a:p>
-      </dgm:t>
-    </dgm:pt>
-    <dgm:pt modelId="{A8DAE118-D90D-405F-8A48-BD8BE5A3AE2E}">
-      <dgm:prSet custT="1"/>
-      <dgm:spPr/>
-      <dgm:t>
-        <a:bodyPr/>
-        <a:lstStyle/>
-        <a:p>
-          <a:pPr>
-            <a:lnSpc>
-              <a:spcPct val="100000"/>
-            </a:lnSpc>
-          </a:pPr>
-          <a:r>
-            <a:rPr lang="en-US" sz="2400" dirty="0"/>
-            <a:t>Julia comes with a built-in package manager named </a:t>
-          </a:r>
-          <a:r>
-            <a:rPr lang="en-US" sz="2400" b="1" dirty="0">
-              <a:highlight>
-                <a:srgbClr val="E5E5E5"/>
-              </a:highlight>
-              <a:latin typeface="+mj-lt"/>
-            </a:rPr>
-            <a:t>Pkg</a:t>
-          </a:r>
-          <a:r>
-            <a:rPr lang="en-US" sz="2400" dirty="0"/>
-            <a:t>, but it also come with an interactive Package Mode: </a:t>
-          </a:r>
-          <a:r>
-            <a:rPr lang="en-US" sz="2400" dirty="0">
-              <a:hlinkClick xmlns:r="http://schemas.openxmlformats.org/officeDocument/2006/relationships" r:id="rId2" action="ppaction://hlinkfile"/>
-            </a:rPr>
-            <a:t>Example</a:t>
-          </a:r>
-          <a:endParaRPr lang="en-US" sz="2400" dirty="0"/>
-        </a:p>
-      </dgm:t>
-    </dgm:pt>
-    <dgm:pt modelId="{65738D12-E7BC-4112-B352-9A085C505902}" type="parTrans" cxnId="{3525641B-AF28-4C3A-8DE2-70130AE2F10D}">
-      <dgm:prSet/>
-      <dgm:spPr/>
-      <dgm:t>
-        <a:bodyPr/>
-        <a:lstStyle/>
-        <a:p>
-          <a:endParaRPr lang="en-US"/>
-        </a:p>
-      </dgm:t>
-    </dgm:pt>
-    <dgm:pt modelId="{BF64290C-DDBC-43C3-8128-6E07F3677945}" type="sibTrans" cxnId="{3525641B-AF28-4C3A-8DE2-70130AE2F10D}">
-      <dgm:prSet/>
-      <dgm:spPr/>
-      <dgm:t>
-        <a:bodyPr/>
-        <a:lstStyle/>
-        <a:p>
-          <a:endParaRPr lang="en-US"/>
-        </a:p>
-      </dgm:t>
-    </dgm:pt>
-    <dgm:pt modelId="{9E739E99-61D0-4A7D-B115-A247A958EF0E}" type="pres">
-      <dgm:prSet presAssocID="{FA18C1CF-0133-4B05-81BD-EBE4742B5909}" presName="vert0" presStyleCnt="0">
-        <dgm:presLayoutVars>
-          <dgm:dir/>
-          <dgm:animOne val="branch"/>
-          <dgm:animLvl val="lvl"/>
-        </dgm:presLayoutVars>
-      </dgm:prSet>
-      <dgm:spPr/>
-    </dgm:pt>
-    <dgm:pt modelId="{62F761B6-FDCF-4857-A28D-48199ED970AE}" type="pres">
-      <dgm:prSet presAssocID="{F2B3F850-92BD-47BF-8540-6BA132756119}" presName="thickLine" presStyleLbl="alignNode1" presStyleIdx="0" presStyleCnt="3"/>
-      <dgm:spPr/>
-    </dgm:pt>
-    <dgm:pt modelId="{0EFD9D8B-6FB4-42BD-8FD9-34B3D5C1304B}" type="pres">
-      <dgm:prSet presAssocID="{F2B3F850-92BD-47BF-8540-6BA132756119}" presName="horz1" presStyleCnt="0"/>
-      <dgm:spPr/>
-    </dgm:pt>
-    <dgm:pt modelId="{E4E32252-1B61-4FB5-AA24-30982D4932AC}" type="pres">
-      <dgm:prSet presAssocID="{F2B3F850-92BD-47BF-8540-6BA132756119}" presName="tx1" presStyleLbl="revTx" presStyleIdx="0" presStyleCnt="3"/>
-      <dgm:spPr/>
-    </dgm:pt>
-    <dgm:pt modelId="{1C0C41FE-ECCB-4E71-A1D5-57950C8D4972}" type="pres">
-      <dgm:prSet presAssocID="{F2B3F850-92BD-47BF-8540-6BA132756119}" presName="vert1" presStyleCnt="0"/>
-      <dgm:spPr/>
-    </dgm:pt>
-    <dgm:pt modelId="{045184D4-7B20-4949-9480-B4A2F2DDAF8F}" type="pres">
-      <dgm:prSet presAssocID="{C3FF1B06-568E-4FB4-AAF0-AD4DA6B78AE8}" presName="thickLine" presStyleLbl="alignNode1" presStyleIdx="1" presStyleCnt="3"/>
-      <dgm:spPr/>
-    </dgm:pt>
-    <dgm:pt modelId="{36F30F9D-32BF-4BFD-AB70-3E9F7760DB21}" type="pres">
-      <dgm:prSet presAssocID="{C3FF1B06-568E-4FB4-AAF0-AD4DA6B78AE8}" presName="horz1" presStyleCnt="0"/>
-      <dgm:spPr/>
-    </dgm:pt>
-    <dgm:pt modelId="{D9455E85-3DBE-4D9E-A2D2-3C8BE4754D98}" type="pres">
-      <dgm:prSet presAssocID="{C3FF1B06-568E-4FB4-AAF0-AD4DA6B78AE8}" presName="tx1" presStyleLbl="revTx" presStyleIdx="1" presStyleCnt="3"/>
-      <dgm:spPr/>
-    </dgm:pt>
-    <dgm:pt modelId="{88324857-6C25-46DF-BBB5-34A82EC66275}" type="pres">
-      <dgm:prSet presAssocID="{C3FF1B06-568E-4FB4-AAF0-AD4DA6B78AE8}" presName="vert1" presStyleCnt="0"/>
-      <dgm:spPr/>
-    </dgm:pt>
-    <dgm:pt modelId="{30B9E4F2-9AB1-4B64-BE72-06E7A21E86D5}" type="pres">
-      <dgm:prSet presAssocID="{A8DAE118-D90D-405F-8A48-BD8BE5A3AE2E}" presName="thickLine" presStyleLbl="alignNode1" presStyleIdx="2" presStyleCnt="3"/>
-      <dgm:spPr/>
-    </dgm:pt>
-    <dgm:pt modelId="{24EAD383-51F1-4DF6-A025-F89BF04E9E74}" type="pres">
-      <dgm:prSet presAssocID="{A8DAE118-D90D-405F-8A48-BD8BE5A3AE2E}" presName="horz1" presStyleCnt="0"/>
-      <dgm:spPr/>
-    </dgm:pt>
-    <dgm:pt modelId="{DC7523BF-D7AB-4B60-8F87-586A02E77A59}" type="pres">
-      <dgm:prSet presAssocID="{A8DAE118-D90D-405F-8A48-BD8BE5A3AE2E}" presName="tx1" presStyleLbl="revTx" presStyleIdx="2" presStyleCnt="3"/>
-      <dgm:spPr/>
-    </dgm:pt>
-    <dgm:pt modelId="{6E2978FA-AF8B-4DE0-BB73-3B58FECA3430}" type="pres">
-      <dgm:prSet presAssocID="{A8DAE118-D90D-405F-8A48-BD8BE5A3AE2E}" presName="vert1" presStyleCnt="0"/>
-      <dgm:spPr/>
-    </dgm:pt>
-  </dgm:ptLst>
-  <dgm:cxnLst>
-    <dgm:cxn modelId="{9F46F517-AD86-459F-8632-0B4BD79C3820}" type="presOf" srcId="{F2B3F850-92BD-47BF-8540-6BA132756119}" destId="{E4E32252-1B61-4FB5-AA24-30982D4932AC}" srcOrd="0" destOrd="0" presId="urn:microsoft.com/office/officeart/2008/layout/LinedList"/>
-    <dgm:cxn modelId="{3525641B-AF28-4C3A-8DE2-70130AE2F10D}" srcId="{FA18C1CF-0133-4B05-81BD-EBE4742B5909}" destId="{A8DAE118-D90D-405F-8A48-BD8BE5A3AE2E}" srcOrd="2" destOrd="0" parTransId="{65738D12-E7BC-4112-B352-9A085C505902}" sibTransId="{BF64290C-DDBC-43C3-8128-6E07F3677945}"/>
-    <dgm:cxn modelId="{E6AA9423-27CF-4BBE-8E3B-FE4DA203A05A}" type="presOf" srcId="{C3FF1B06-568E-4FB4-AAF0-AD4DA6B78AE8}" destId="{D9455E85-3DBE-4D9E-A2D2-3C8BE4754D98}" srcOrd="0" destOrd="0" presId="urn:microsoft.com/office/officeart/2008/layout/LinedList"/>
-    <dgm:cxn modelId="{5D6B3B4E-7FA2-40F3-B2D2-DDC611A8F064}" type="presOf" srcId="{FA18C1CF-0133-4B05-81BD-EBE4742B5909}" destId="{9E739E99-61D0-4A7D-B115-A247A958EF0E}" srcOrd="0" destOrd="0" presId="urn:microsoft.com/office/officeart/2008/layout/LinedList"/>
-    <dgm:cxn modelId="{A486ED7D-3567-4F7D-A3EF-3F42CAEAF9B0}" srcId="{FA18C1CF-0133-4B05-81BD-EBE4742B5909}" destId="{F2B3F850-92BD-47BF-8540-6BA132756119}" srcOrd="0" destOrd="0" parTransId="{B35A21EB-CC0F-433D-8912-DF61D154C278}" sibTransId="{3FCB08DB-B246-4C95-A892-3E8B66676D2E}"/>
-    <dgm:cxn modelId="{2BF93C9A-43E3-4713-BB68-983BD35B3ABC}" srcId="{FA18C1CF-0133-4B05-81BD-EBE4742B5909}" destId="{C3FF1B06-568E-4FB4-AAF0-AD4DA6B78AE8}" srcOrd="1" destOrd="0" parTransId="{40346FC3-2B86-435D-A600-E66505FC7847}" sibTransId="{6B92CF39-8E56-4A65-A05D-5D0DBA604D72}"/>
-    <dgm:cxn modelId="{84B119F9-5D35-4DB6-ACFA-2E3139CEB590}" type="presOf" srcId="{A8DAE118-D90D-405F-8A48-BD8BE5A3AE2E}" destId="{DC7523BF-D7AB-4B60-8F87-586A02E77A59}" srcOrd="0" destOrd="0" presId="urn:microsoft.com/office/officeart/2008/layout/LinedList"/>
-    <dgm:cxn modelId="{3024AC52-CBA5-490A-9562-57BEA527497C}" type="presParOf" srcId="{9E739E99-61D0-4A7D-B115-A247A958EF0E}" destId="{62F761B6-FDCF-4857-A28D-48199ED970AE}" srcOrd="0" destOrd="0" presId="urn:microsoft.com/office/officeart/2008/layout/LinedList"/>
-    <dgm:cxn modelId="{36B3B6A4-A17C-46A5-9CA5-786E670525AD}" type="presParOf" srcId="{9E739E99-61D0-4A7D-B115-A247A958EF0E}" destId="{0EFD9D8B-6FB4-42BD-8FD9-34B3D5C1304B}" srcOrd="1" destOrd="0" presId="urn:microsoft.com/office/officeart/2008/layout/LinedList"/>
-    <dgm:cxn modelId="{61F03D71-E021-4290-9C71-15DDE23FA4D7}" type="presParOf" srcId="{0EFD9D8B-6FB4-42BD-8FD9-34B3D5C1304B}" destId="{E4E32252-1B61-4FB5-AA24-30982D4932AC}" srcOrd="0" destOrd="0" presId="urn:microsoft.com/office/officeart/2008/layout/LinedList"/>
-    <dgm:cxn modelId="{0F515CB0-9A39-4991-95AA-0496AA9E0262}" type="presParOf" srcId="{0EFD9D8B-6FB4-42BD-8FD9-34B3D5C1304B}" destId="{1C0C41FE-ECCB-4E71-A1D5-57950C8D4972}" srcOrd="1" destOrd="0" presId="urn:microsoft.com/office/officeart/2008/layout/LinedList"/>
-    <dgm:cxn modelId="{DFD37C40-684B-42D3-9869-2F398AB261BF}" type="presParOf" srcId="{9E739E99-61D0-4A7D-B115-A247A958EF0E}" destId="{045184D4-7B20-4949-9480-B4A2F2DDAF8F}" srcOrd="2" destOrd="0" presId="urn:microsoft.com/office/officeart/2008/layout/LinedList"/>
-    <dgm:cxn modelId="{D8F102A3-B02D-485F-846B-DE99E44B461C}" type="presParOf" srcId="{9E739E99-61D0-4A7D-B115-A247A958EF0E}" destId="{36F30F9D-32BF-4BFD-AB70-3E9F7760DB21}" srcOrd="3" destOrd="0" presId="urn:microsoft.com/office/officeart/2008/layout/LinedList"/>
-    <dgm:cxn modelId="{A2C1E1A6-4CE6-4EC1-A73B-8C854A8C60BF}" type="presParOf" srcId="{36F30F9D-32BF-4BFD-AB70-3E9F7760DB21}" destId="{D9455E85-3DBE-4D9E-A2D2-3C8BE4754D98}" srcOrd="0" destOrd="0" presId="urn:microsoft.com/office/officeart/2008/layout/LinedList"/>
-    <dgm:cxn modelId="{4EE84D29-2B87-4F6F-A883-E226E50463D4}" type="presParOf" srcId="{36F30F9D-32BF-4BFD-AB70-3E9F7760DB21}" destId="{88324857-6C25-46DF-BBB5-34A82EC66275}" srcOrd="1" destOrd="0" presId="urn:microsoft.com/office/officeart/2008/layout/LinedList"/>
-    <dgm:cxn modelId="{43230E26-01F8-43B4-8185-2492C0F6F111}" type="presParOf" srcId="{9E739E99-61D0-4A7D-B115-A247A958EF0E}" destId="{30B9E4F2-9AB1-4B64-BE72-06E7A21E86D5}" srcOrd="4" destOrd="0" presId="urn:microsoft.com/office/officeart/2008/layout/LinedList"/>
-    <dgm:cxn modelId="{F033B0D1-69E8-4103-AAA2-E829A3730D22}" type="presParOf" srcId="{9E739E99-61D0-4A7D-B115-A247A958EF0E}" destId="{24EAD383-51F1-4DF6-A025-F89BF04E9E74}" srcOrd="5" destOrd="0" presId="urn:microsoft.com/office/officeart/2008/layout/LinedList"/>
-    <dgm:cxn modelId="{BDD70C05-F620-49AE-891D-2408E26B67CA}" type="presParOf" srcId="{24EAD383-51F1-4DF6-A025-F89BF04E9E74}" destId="{DC7523BF-D7AB-4B60-8F87-586A02E77A59}" srcOrd="0" destOrd="0" presId="urn:microsoft.com/office/officeart/2008/layout/LinedList"/>
-    <dgm:cxn modelId="{FDA1DDD2-7195-451E-905F-4CE1326EFD0B}" type="presParOf" srcId="{24EAD383-51F1-4DF6-A025-F89BF04E9E74}" destId="{6E2978FA-AF8B-4DE0-BB73-3B58FECA3430}" srcOrd="1" destOrd="0" presId="urn:microsoft.com/office/officeart/2008/layout/LinedList"/>
   </dgm:cxnLst>
   <dgm:bg/>
   <dgm:whole/>
@@ -6288,391 +5212,6 @@
 </dsp:drawing>
 </file>
 
-<file path=ppt/diagrams/drawing4.xml><?xml version="1.0" encoding="utf-8"?>
-<dsp:drawing xmlns:dgm="http://schemas.openxmlformats.org/drawingml/2006/diagram" xmlns:dsp="http://schemas.microsoft.com/office/drawing/2008/diagram" xmlns:a="http://schemas.openxmlformats.org/drawingml/2006/main">
-  <dsp:spTree>
-    <dsp:nvGrpSpPr>
-      <dsp:cNvPr id="0" name=""/>
-      <dsp:cNvGrpSpPr/>
-    </dsp:nvGrpSpPr>
-    <dsp:grpSpPr/>
-    <dsp:sp modelId="{62F761B6-FDCF-4857-A28D-48199ED970AE}">
-      <dsp:nvSpPr>
-        <dsp:cNvPr id="0" name=""/>
-        <dsp:cNvSpPr/>
-      </dsp:nvSpPr>
-      <dsp:spPr>
-        <a:xfrm>
-          <a:off x="0" y="2492"/>
-          <a:ext cx="7142163" cy="0"/>
-        </a:xfrm>
-        <a:prstGeom prst="line">
-          <a:avLst/>
-        </a:prstGeom>
-        <a:solidFill>
-          <a:schemeClr val="lt1">
-            <a:hueOff val="0"/>
-            <a:satOff val="0"/>
-            <a:lumOff val="0"/>
-            <a:alphaOff val="0"/>
-          </a:schemeClr>
-        </a:solidFill>
-        <a:ln w="12700" cap="flat" cmpd="sng" algn="ctr">
-          <a:solidFill>
-            <a:schemeClr val="dk1">
-              <a:shade val="80000"/>
-              <a:hueOff val="0"/>
-              <a:satOff val="0"/>
-              <a:lumOff val="0"/>
-              <a:alphaOff val="0"/>
-            </a:schemeClr>
-          </a:solidFill>
-          <a:prstDash val="solid"/>
-          <a:miter lim="800000"/>
-        </a:ln>
-        <a:effectLst/>
-      </dsp:spPr>
-      <dsp:style>
-        <a:lnRef idx="2">
-          <a:scrgbClr r="0" g="0" b="0"/>
-        </a:lnRef>
-        <a:fillRef idx="1">
-          <a:scrgbClr r="0" g="0" b="0"/>
-        </a:fillRef>
-        <a:effectRef idx="0">
-          <a:scrgbClr r="0" g="0" b="0"/>
-        </a:effectRef>
-        <a:fontRef idx="minor">
-          <a:schemeClr val="lt1"/>
-        </a:fontRef>
-      </dsp:style>
-    </dsp:sp>
-    <dsp:sp modelId="{E4E32252-1B61-4FB5-AA24-30982D4932AC}">
-      <dsp:nvSpPr>
-        <dsp:cNvPr id="0" name=""/>
-        <dsp:cNvSpPr/>
-      </dsp:nvSpPr>
-      <dsp:spPr>
-        <a:xfrm>
-          <a:off x="0" y="2492"/>
-          <a:ext cx="7142163" cy="1700138"/>
-        </a:xfrm>
-        <a:prstGeom prst="rect">
-          <a:avLst/>
-        </a:prstGeom>
-        <a:noFill/>
-        <a:ln>
-          <a:noFill/>
-        </a:ln>
-        <a:effectLst/>
-      </dsp:spPr>
-      <dsp:style>
-        <a:lnRef idx="0">
-          <a:scrgbClr r="0" g="0" b="0"/>
-        </a:lnRef>
-        <a:fillRef idx="0">
-          <a:scrgbClr r="0" g="0" b="0"/>
-        </a:fillRef>
-        <a:effectRef idx="0">
-          <a:scrgbClr r="0" g="0" b="0"/>
-        </a:effectRef>
-        <a:fontRef idx="minor"/>
-      </dsp:style>
-      <dsp:txBody>
-        <a:bodyPr spcFirstLastPara="0" vert="horz" wrap="square" lIns="91440" tIns="91440" rIns="91440" bIns="91440" numCol="1" spcCol="1270" anchor="t" anchorCtr="0">
-          <a:noAutofit/>
-        </a:bodyPr>
-        <a:lstStyle/>
-        <a:p>
-          <a:pPr marL="0" lvl="0" indent="0" algn="l" defTabSz="1066800">
-            <a:lnSpc>
-              <a:spcPct val="100000"/>
-            </a:lnSpc>
-            <a:spcBef>
-              <a:spcPct val="0"/>
-            </a:spcBef>
-            <a:spcAft>
-              <a:spcPct val="35000"/>
-            </a:spcAft>
-            <a:buNone/>
-          </a:pPr>
-          <a:r>
-            <a:rPr lang="en-US" sz="2400" kern="1200"/>
-            <a:t>Julia has over 6500 registered packages. They are a substantial part of the Julia ecosystem.</a:t>
-          </a:r>
-          <a:br>
-            <a:rPr lang="en-US" sz="2600" kern="1200"/>
-          </a:br>
-          <a:br>
-            <a:rPr lang="en-US" sz="2600" kern="1200"/>
-          </a:br>
-          <a:endParaRPr lang="en-US" sz="2600" kern="1200" dirty="0"/>
-        </a:p>
-      </dsp:txBody>
-      <dsp:txXfrm>
-        <a:off x="0" y="2492"/>
-        <a:ext cx="7142163" cy="1700138"/>
-      </dsp:txXfrm>
-    </dsp:sp>
-    <dsp:sp modelId="{045184D4-7B20-4949-9480-B4A2F2DDAF8F}">
-      <dsp:nvSpPr>
-        <dsp:cNvPr id="0" name=""/>
-        <dsp:cNvSpPr/>
-      </dsp:nvSpPr>
-      <dsp:spPr>
-        <a:xfrm>
-          <a:off x="0" y="1702630"/>
-          <a:ext cx="7142163" cy="0"/>
-        </a:xfrm>
-        <a:prstGeom prst="line">
-          <a:avLst/>
-        </a:prstGeom>
-        <a:solidFill>
-          <a:schemeClr val="lt1">
-            <a:hueOff val="0"/>
-            <a:satOff val="0"/>
-            <a:lumOff val="0"/>
-            <a:alphaOff val="0"/>
-          </a:schemeClr>
-        </a:solidFill>
-        <a:ln w="12700" cap="flat" cmpd="sng" algn="ctr">
-          <a:solidFill>
-            <a:schemeClr val="dk1">
-              <a:shade val="80000"/>
-              <a:hueOff val="0"/>
-              <a:satOff val="0"/>
-              <a:lumOff val="0"/>
-              <a:alphaOff val="0"/>
-            </a:schemeClr>
-          </a:solidFill>
-          <a:prstDash val="solid"/>
-          <a:miter lim="800000"/>
-        </a:ln>
-        <a:effectLst/>
-      </dsp:spPr>
-      <dsp:style>
-        <a:lnRef idx="2">
-          <a:scrgbClr r="0" g="0" b="0"/>
-        </a:lnRef>
-        <a:fillRef idx="1">
-          <a:scrgbClr r="0" g="0" b="0"/>
-        </a:fillRef>
-        <a:effectRef idx="0">
-          <a:scrgbClr r="0" g="0" b="0"/>
-        </a:effectRef>
-        <a:fontRef idx="minor">
-          <a:schemeClr val="lt1"/>
-        </a:fontRef>
-      </dsp:style>
-    </dsp:sp>
-    <dsp:sp modelId="{D9455E85-3DBE-4D9E-A2D2-3C8BE4754D98}">
-      <dsp:nvSpPr>
-        <dsp:cNvPr id="0" name=""/>
-        <dsp:cNvSpPr/>
-      </dsp:nvSpPr>
-      <dsp:spPr>
-        <a:xfrm>
-          <a:off x="0" y="1702630"/>
-          <a:ext cx="7142163" cy="1700138"/>
-        </a:xfrm>
-        <a:prstGeom prst="rect">
-          <a:avLst/>
-        </a:prstGeom>
-        <a:noFill/>
-        <a:ln>
-          <a:noFill/>
-        </a:ln>
-        <a:effectLst/>
-      </dsp:spPr>
-      <dsp:style>
-        <a:lnRef idx="0">
-          <a:scrgbClr r="0" g="0" b="0"/>
-        </a:lnRef>
-        <a:fillRef idx="0">
-          <a:scrgbClr r="0" g="0" b="0"/>
-        </a:fillRef>
-        <a:effectRef idx="0">
-          <a:scrgbClr r="0" g="0" b="0"/>
-        </a:effectRef>
-        <a:fontRef idx="minor"/>
-      </dsp:style>
-      <dsp:txBody>
-        <a:bodyPr spcFirstLastPara="0" vert="horz" wrap="square" lIns="91440" tIns="91440" rIns="91440" bIns="91440" numCol="1" spcCol="1270" anchor="t" anchorCtr="0">
-          <a:noAutofit/>
-        </a:bodyPr>
-        <a:lstStyle/>
-        <a:p>
-          <a:pPr marL="0" lvl="0" indent="0" algn="l" defTabSz="1066800">
-            <a:lnSpc>
-              <a:spcPct val="100000"/>
-            </a:lnSpc>
-            <a:spcBef>
-              <a:spcPct val="0"/>
-            </a:spcBef>
-            <a:spcAft>
-              <a:spcPct val="35000"/>
-            </a:spcAft>
-            <a:buNone/>
-          </a:pPr>
-          <a:r>
-            <a:rPr lang="en-US" sz="2400" kern="1200"/>
-            <a:t>To explore existing packages related to your area of interest you can check out the following link: </a:t>
-          </a:r>
-          <a:r>
-            <a:rPr lang="en-US" sz="2400" kern="1200">
-              <a:hlinkClick xmlns:r="http://schemas.openxmlformats.org/officeDocument/2006/relationships" r:id="rId1"/>
-            </a:rPr>
-            <a:t>https://juliahub.com/ui/Packages</a:t>
-          </a:r>
-          <a:br>
-            <a:rPr lang="en-US" sz="2100" kern="1200"/>
-          </a:br>
-          <a:br>
-            <a:rPr lang="en-US" sz="2100" kern="1200"/>
-          </a:br>
-          <a:endParaRPr lang="en-US" sz="2100" kern="1200" dirty="0"/>
-        </a:p>
-      </dsp:txBody>
-      <dsp:txXfrm>
-        <a:off x="0" y="1702630"/>
-        <a:ext cx="7142163" cy="1700138"/>
-      </dsp:txXfrm>
-    </dsp:sp>
-    <dsp:sp modelId="{30B9E4F2-9AB1-4B64-BE72-06E7A21E86D5}">
-      <dsp:nvSpPr>
-        <dsp:cNvPr id="0" name=""/>
-        <dsp:cNvSpPr/>
-      </dsp:nvSpPr>
-      <dsp:spPr>
-        <a:xfrm>
-          <a:off x="0" y="3402769"/>
-          <a:ext cx="7142163" cy="0"/>
-        </a:xfrm>
-        <a:prstGeom prst="line">
-          <a:avLst/>
-        </a:prstGeom>
-        <a:solidFill>
-          <a:schemeClr val="lt1">
-            <a:hueOff val="0"/>
-            <a:satOff val="0"/>
-            <a:lumOff val="0"/>
-            <a:alphaOff val="0"/>
-          </a:schemeClr>
-        </a:solidFill>
-        <a:ln w="12700" cap="flat" cmpd="sng" algn="ctr">
-          <a:solidFill>
-            <a:schemeClr val="dk1">
-              <a:shade val="80000"/>
-              <a:hueOff val="0"/>
-              <a:satOff val="0"/>
-              <a:lumOff val="0"/>
-              <a:alphaOff val="0"/>
-            </a:schemeClr>
-          </a:solidFill>
-          <a:prstDash val="solid"/>
-          <a:miter lim="800000"/>
-        </a:ln>
-        <a:effectLst/>
-      </dsp:spPr>
-      <dsp:style>
-        <a:lnRef idx="2">
-          <a:scrgbClr r="0" g="0" b="0"/>
-        </a:lnRef>
-        <a:fillRef idx="1">
-          <a:scrgbClr r="0" g="0" b="0"/>
-        </a:fillRef>
-        <a:effectRef idx="0">
-          <a:scrgbClr r="0" g="0" b="0"/>
-        </a:effectRef>
-        <a:fontRef idx="minor">
-          <a:schemeClr val="lt1"/>
-        </a:fontRef>
-      </dsp:style>
-    </dsp:sp>
-    <dsp:sp modelId="{DC7523BF-D7AB-4B60-8F87-586A02E77A59}">
-      <dsp:nvSpPr>
-        <dsp:cNvPr id="0" name=""/>
-        <dsp:cNvSpPr/>
-      </dsp:nvSpPr>
-      <dsp:spPr>
-        <a:xfrm>
-          <a:off x="0" y="3402769"/>
-          <a:ext cx="7142163" cy="1700138"/>
-        </a:xfrm>
-        <a:prstGeom prst="rect">
-          <a:avLst/>
-        </a:prstGeom>
-        <a:noFill/>
-        <a:ln>
-          <a:noFill/>
-        </a:ln>
-        <a:effectLst/>
-      </dsp:spPr>
-      <dsp:style>
-        <a:lnRef idx="0">
-          <a:scrgbClr r="0" g="0" b="0"/>
-        </a:lnRef>
-        <a:fillRef idx="0">
-          <a:scrgbClr r="0" g="0" b="0"/>
-        </a:fillRef>
-        <a:effectRef idx="0">
-          <a:scrgbClr r="0" g="0" b="0"/>
-        </a:effectRef>
-        <a:fontRef idx="minor"/>
-      </dsp:style>
-      <dsp:txBody>
-        <a:bodyPr spcFirstLastPara="0" vert="horz" wrap="square" lIns="91440" tIns="91440" rIns="91440" bIns="91440" numCol="1" spcCol="1270" anchor="t" anchorCtr="0">
-          <a:noAutofit/>
-        </a:bodyPr>
-        <a:lstStyle/>
-        <a:p>
-          <a:pPr marL="0" lvl="0" indent="0" algn="l" defTabSz="1066800">
-            <a:lnSpc>
-              <a:spcPct val="100000"/>
-            </a:lnSpc>
-            <a:spcBef>
-              <a:spcPct val="0"/>
-            </a:spcBef>
-            <a:spcAft>
-              <a:spcPct val="35000"/>
-            </a:spcAft>
-            <a:buNone/>
-          </a:pPr>
-          <a:r>
-            <a:rPr lang="en-US" sz="2400" kern="1200" dirty="0"/>
-            <a:t>Julia comes with a built-in package manager named </a:t>
-          </a:r>
-          <a:r>
-            <a:rPr lang="en-US" sz="2400" b="1" kern="1200" dirty="0">
-              <a:highlight>
-                <a:srgbClr val="E5E5E5"/>
-              </a:highlight>
-              <a:latin typeface="+mj-lt"/>
-            </a:rPr>
-            <a:t>Pkg</a:t>
-          </a:r>
-          <a:r>
-            <a:rPr lang="en-US" sz="2400" kern="1200" dirty="0"/>
-            <a:t>, but it also come with an interactive Package Mode: </a:t>
-          </a:r>
-          <a:r>
-            <a:rPr lang="en-US" sz="2400" kern="1200" dirty="0">
-              <a:hlinkClick xmlns:r="http://schemas.openxmlformats.org/officeDocument/2006/relationships" r:id="rId2" action="ppaction://hlinkfile"/>
-            </a:rPr>
-            <a:t>Example</a:t>
-          </a:r>
-          <a:endParaRPr lang="en-US" sz="2400" kern="1200" dirty="0"/>
-        </a:p>
-      </dsp:txBody>
-      <dsp:txXfrm>
-        <a:off x="0" y="3402769"/>
-        <a:ext cx="7142163" cy="1700138"/>
-      </dsp:txXfrm>
-    </dsp:sp>
-  </dsp:spTree>
-</dsp:drawing>
-</file>
-
 <file path=ppt/diagrams/layout1.xml><?xml version="1.0" encoding="utf-8"?>
 <dgm:layoutDef xmlns:dgm="http://schemas.openxmlformats.org/drawingml/2006/diagram" xmlns:a="http://schemas.openxmlformats.org/drawingml/2006/main" uniqueId="urn:microsoft.com/office/officeart/2018/2/layout/IconVerticalSolidList">
   <dgm:title val="Icon Vertical Solid List"/>
@@ -7727,472 +6266,6 @@
 </dgm:layoutDef>
 </file>
 
-<file path=ppt/diagrams/layout4.xml><?xml version="1.0" encoding="utf-8"?>
-<dgm:layoutDef xmlns:dgm="http://schemas.openxmlformats.org/drawingml/2006/diagram" xmlns:a="http://schemas.openxmlformats.org/drawingml/2006/main" uniqueId="urn:microsoft.com/office/officeart/2008/layout/LinedList">
-  <dgm:title val=""/>
-  <dgm:desc val=""/>
-  <dgm:catLst>
-    <dgm:cat type="hierarchy" pri="8000"/>
-    <dgm:cat type="list" pri="2500"/>
-  </dgm:catLst>
-  <dgm:sampData>
-    <dgm:dataModel>
-      <dgm:ptLst>
-        <dgm:pt modelId="0" type="doc"/>
-        <dgm:pt modelId="1">
-          <dgm:prSet phldr="1"/>
-        </dgm:pt>
-        <dgm:pt modelId="11">
-          <dgm:prSet phldr="1"/>
-        </dgm:pt>
-        <dgm:pt modelId="12">
-          <dgm:prSet phldr="1"/>
-        </dgm:pt>
-        <dgm:pt modelId="13">
-          <dgm:prSet phldr="1"/>
-        </dgm:pt>
-      </dgm:ptLst>
-      <dgm:cxnLst>
-        <dgm:cxn modelId="2" srcId="0" destId="1" srcOrd="0" destOrd="0"/>
-        <dgm:cxn modelId="3" srcId="1" destId="11" srcOrd="0" destOrd="0"/>
-        <dgm:cxn modelId="4" srcId="1" destId="12" srcOrd="1" destOrd="0"/>
-        <dgm:cxn modelId="5" srcId="1" destId="13" srcOrd="2" destOrd="0"/>
-      </dgm:cxnLst>
-      <dgm:bg/>
-      <dgm:whole/>
-    </dgm:dataModel>
-  </dgm:sampData>
-  <dgm:styleData>
-    <dgm:dataModel>
-      <dgm:ptLst>
-        <dgm:pt modelId="0" type="doc"/>
-        <dgm:pt modelId="1">
-          <dgm:prSet phldr="1"/>
-        </dgm:pt>
-        <dgm:pt modelId="11">
-          <dgm:prSet phldr="1"/>
-        </dgm:pt>
-        <dgm:pt modelId="12">
-          <dgm:prSet phldr="1"/>
-        </dgm:pt>
-      </dgm:ptLst>
-      <dgm:cxnLst>
-        <dgm:cxn modelId="2" srcId="0" destId="1" srcOrd="0" destOrd="0"/>
-        <dgm:cxn modelId="3" srcId="1" destId="11" srcOrd="0" destOrd="0"/>
-        <dgm:cxn modelId="4" srcId="1" destId="12" srcOrd="1" destOrd="0"/>
-      </dgm:cxnLst>
-      <dgm:bg/>
-      <dgm:whole/>
-    </dgm:dataModel>
-  </dgm:styleData>
-  <dgm:clrData>
-    <dgm:dataModel>
-      <dgm:ptLst>
-        <dgm:pt modelId="0" type="doc"/>
-        <dgm:pt modelId="1">
-          <dgm:prSet phldr="1"/>
-        </dgm:pt>
-        <dgm:pt modelId="11">
-          <dgm:prSet phldr="1"/>
-        </dgm:pt>
-        <dgm:pt modelId="12">
-          <dgm:prSet phldr="1"/>
-        </dgm:pt>
-      </dgm:ptLst>
-      <dgm:cxnLst>
-        <dgm:cxn modelId="2" srcId="0" destId="1" srcOrd="0" destOrd="0"/>
-        <dgm:cxn modelId="3" srcId="1" destId="11" srcOrd="0" destOrd="0"/>
-        <dgm:cxn modelId="4" srcId="1" destId="12" srcOrd="1" destOrd="0"/>
-      </dgm:cxnLst>
-      <dgm:bg/>
-      <dgm:whole/>
-    </dgm:dataModel>
-  </dgm:clrData>
-  <dgm:layoutNode name="vert0">
-    <dgm:varLst>
-      <dgm:dir/>
-      <dgm:animOne val="branch"/>
-      <dgm:animLvl val="lvl"/>
-    </dgm:varLst>
-    <dgm:choose name="Name0">
-      <dgm:if name="Name1" func="var" arg="dir" op="equ" val="norm">
-        <dgm:alg type="lin">
-          <dgm:param type="linDir" val="fromT"/>
-          <dgm:param type="nodeHorzAlign" val="l"/>
-        </dgm:alg>
-      </dgm:if>
-      <dgm:else name="Name2">
-        <dgm:alg type="lin">
-          <dgm:param type="linDir" val="fromT"/>
-          <dgm:param type="nodeHorzAlign" val="r"/>
-        </dgm:alg>
-      </dgm:else>
-    </dgm:choose>
-    <dgm:shape xmlns:r="http://schemas.openxmlformats.org/officeDocument/2006/relationships" r:blip="">
-      <dgm:adjLst/>
-    </dgm:shape>
-    <dgm:presOf/>
-    <dgm:constrLst>
-      <dgm:constr type="w" for="ch" forName="horz1" refType="w"/>
-      <dgm:constr type="h" for="ch" forName="horz1" refType="h"/>
-      <dgm:constr type="h" for="des" forName="vert1" refType="h"/>
-      <dgm:constr type="h" for="des" forName="tx1" refType="h"/>
-      <dgm:constr type="h" for="des" forName="horz2" refType="h"/>
-      <dgm:constr type="h" for="des" forName="vert2" refType="h"/>
-      <dgm:constr type="h" for="des" forName="horz3" refType="h"/>
-      <dgm:constr type="h" for="des" forName="vert3" refType="h"/>
-      <dgm:constr type="h" for="des" forName="horz4" refType="h"/>
-      <dgm:constr type="h" for="des" ptType="node" refType="h"/>
-      <dgm:constr type="primFontSz" for="des" forName="tx1" op="equ" val="65"/>
-      <dgm:constr type="primFontSz" for="des" forName="tx2" op="equ" val="65"/>
-      <dgm:constr type="primFontSz" for="des" forName="tx3" op="equ" val="65"/>
-      <dgm:constr type="primFontSz" for="des" forName="tx4" op="equ" val="65"/>
-      <dgm:constr type="w" for="des" forName="thickLine" refType="w"/>
-      <dgm:constr type="h" for="des" forName="thickLine"/>
-      <dgm:constr type="h" for="des" forName="thinLine1"/>
-      <dgm:constr type="h" for="des" forName="thinLine2b"/>
-      <dgm:constr type="h" for="des" forName="thinLine3"/>
-      <dgm:constr type="h" for="des" forName="vertSpace2a" refType="h" fact="0.05"/>
-      <dgm:constr type="h" for="des" forName="vertSpace2b" refType="h" refFor="des" refForName="vertSpace2a"/>
-    </dgm:constrLst>
-    <dgm:forEach name="Name3" axis="ch" ptType="node">
-      <dgm:layoutNode name="thickLine" styleLbl="alignNode1">
-        <dgm:alg type="sp"/>
-        <dgm:shape xmlns:r="http://schemas.openxmlformats.org/officeDocument/2006/relationships" type="line" r:blip="">
-          <dgm:adjLst/>
-        </dgm:shape>
-        <dgm:presOf/>
-      </dgm:layoutNode>
-      <dgm:layoutNode name="horz1">
-        <dgm:choose name="Name4">
-          <dgm:if name="Name5" func="var" arg="dir" op="equ" val="norm">
-            <dgm:alg type="lin">
-              <dgm:param type="linDir" val="fromL"/>
-              <dgm:param type="nodeVertAlign" val="t"/>
-            </dgm:alg>
-          </dgm:if>
-          <dgm:else name="Name6">
-            <dgm:alg type="lin">
-              <dgm:param type="linDir" val="fromR"/>
-              <dgm:param type="nodeVertAlign" val="t"/>
-            </dgm:alg>
-          </dgm:else>
-        </dgm:choose>
-        <dgm:shape xmlns:r="http://schemas.openxmlformats.org/officeDocument/2006/relationships" r:blip="">
-          <dgm:adjLst/>
-        </dgm:shape>
-        <dgm:presOf/>
-        <dgm:choose name="Name7">
-          <dgm:if name="Name8" axis="root des" func="maxDepth" op="equ" val="1">
-            <dgm:constrLst>
-              <dgm:constr type="w" for="ch" forName="tx1" refType="w"/>
-            </dgm:constrLst>
-          </dgm:if>
-          <dgm:if name="Name9" axis="root des" func="maxDepth" op="equ" val="2">
-            <dgm:constrLst>
-              <dgm:constr type="w" for="ch" forName="tx1" refType="w" fact="0.2"/>
-              <dgm:constr type="w" for="des" forName="tx2" refType="w" fact="0.785"/>
-              <dgm:constr type="w" for="des" forName="horzSpace2" refType="w" fact="0.015"/>
-              <dgm:constr type="w" for="des" forName="thinLine2b" refType="w" fact="0.8"/>
-            </dgm:constrLst>
-          </dgm:if>
-          <dgm:if name="Name10" axis="root des" func="maxDepth" op="equ" val="3">
-            <dgm:constrLst>
-              <dgm:constr type="w" for="ch" forName="tx1" refType="w" fact="0.2"/>
-              <dgm:constr type="w" for="des" forName="tx2" refType="w" fact="0.385"/>
-              <dgm:constr type="w" for="des" forName="tx3" refType="w" fact="0.385"/>
-              <dgm:constr type="w" for="des" forName="horzSpace2" refType="w" fact="0.015"/>
-              <dgm:constr type="w" for="des" forName="horzSpace3" refType="w" fact="0.015"/>
-              <dgm:constr type="w" for="des" forName="thinLine2b" refType="w" fact="0.8"/>
-              <dgm:constr type="w" for="des" forName="thinLine3" refType="w" fact="0.385"/>
-            </dgm:constrLst>
-          </dgm:if>
-          <dgm:if name="Name11" axis="root des" func="maxDepth" op="gte" val="4">
-            <dgm:constrLst>
-              <dgm:constr type="w" for="ch" forName="tx1" refType="w" fact="0.2"/>
-              <dgm:constr type="w" for="des" forName="tx2" refType="w" fact="0.2516"/>
-              <dgm:constr type="w" for="des" forName="tx3" refType="w" fact="0.2516"/>
-              <dgm:constr type="w" for="des" forName="tx4" refType="w" fact="0.2516"/>
-              <dgm:constr type="w" for="des" forName="horzSpace2" refType="w" fact="0.015"/>
-              <dgm:constr type="w" for="des" forName="horzSpace3" refType="w" fact="0.015"/>
-              <dgm:constr type="w" for="des" forName="horzSpace4" refType="w" fact="0.015"/>
-              <dgm:constr type="w" for="des" forName="thinLine2b" refType="w" fact="0.8"/>
-              <dgm:constr type="w" for="des" forName="thinLine3" refType="w" fact="0.5332"/>
-            </dgm:constrLst>
-          </dgm:if>
-          <dgm:else name="Name12"/>
-        </dgm:choose>
-        <dgm:layoutNode name="tx1" styleLbl="revTx">
-          <dgm:alg type="tx">
-            <dgm:param type="parTxLTRAlign" val="l"/>
-            <dgm:param type="parTxRTLAlign" val="r"/>
-            <dgm:param type="txAnchorVert" val="t"/>
-          </dgm:alg>
-          <dgm:shape xmlns:r="http://schemas.openxmlformats.org/officeDocument/2006/relationships" type="rect" r:blip="">
-            <dgm:adjLst/>
-          </dgm:shape>
-          <dgm:presOf axis="self"/>
-          <dgm:constrLst>
-            <dgm:constr type="tMarg" refType="primFontSz" fact="0.3"/>
-            <dgm:constr type="bMarg" refType="primFontSz" fact="0.3"/>
-            <dgm:constr type="lMarg" refType="primFontSz" fact="0.3"/>
-            <dgm:constr type="rMarg" refType="primFontSz" fact="0.3"/>
-          </dgm:constrLst>
-          <dgm:ruleLst>
-            <dgm:rule type="primFontSz" val="5" fact="NaN" max="NaN"/>
-          </dgm:ruleLst>
-        </dgm:layoutNode>
-        <dgm:layoutNode name="vert1">
-          <dgm:choose name="Name13">
-            <dgm:if name="Name14" func="var" arg="dir" op="equ" val="norm">
-              <dgm:alg type="lin">
-                <dgm:param type="linDir" val="fromT"/>
-                <dgm:param type="nodeHorzAlign" val="l"/>
-              </dgm:alg>
-            </dgm:if>
-            <dgm:else name="Name15">
-              <dgm:alg type="lin">
-                <dgm:param type="linDir" val="fromT"/>
-                <dgm:param type="nodeHorzAlign" val="r"/>
-              </dgm:alg>
-            </dgm:else>
-          </dgm:choose>
-          <dgm:shape xmlns:r="http://schemas.openxmlformats.org/officeDocument/2006/relationships" r:blip="">
-            <dgm:adjLst/>
-          </dgm:shape>
-          <dgm:presOf/>
-          <dgm:forEach name="Name16" axis="ch" ptType="node">
-            <dgm:choose name="Name17">
-              <dgm:if name="Name18" axis="self" ptType="node" func="pos" op="equ" val="1">
-                <dgm:layoutNode name="vertSpace2a">
-                  <dgm:alg type="sp"/>
-                  <dgm:shape xmlns:r="http://schemas.openxmlformats.org/officeDocument/2006/relationships" r:blip="">
-                    <dgm:adjLst/>
-                  </dgm:shape>
-                  <dgm:presOf/>
-                </dgm:layoutNode>
-              </dgm:if>
-              <dgm:else name="Name19"/>
-            </dgm:choose>
-            <dgm:layoutNode name="horz2">
-              <dgm:choose name="Name20">
-                <dgm:if name="Name21" func="var" arg="dir" op="equ" val="norm">
-                  <dgm:alg type="lin">
-                    <dgm:param type="linDir" val="fromL"/>
-                    <dgm:param type="nodeVertAlign" val="t"/>
-                  </dgm:alg>
-                </dgm:if>
-                <dgm:else name="Name22">
-                  <dgm:alg type="lin">
-                    <dgm:param type="linDir" val="fromR"/>
-                    <dgm:param type="nodeVertAlign" val="t"/>
-                  </dgm:alg>
-                </dgm:else>
-              </dgm:choose>
-              <dgm:shape xmlns:r="http://schemas.openxmlformats.org/officeDocument/2006/relationships" r:blip="">
-                <dgm:adjLst/>
-              </dgm:shape>
-              <dgm:presOf/>
-              <dgm:layoutNode name="horzSpace2">
-                <dgm:alg type="sp"/>
-                <dgm:shape xmlns:r="http://schemas.openxmlformats.org/officeDocument/2006/relationships" r:blip="">
-                  <dgm:adjLst/>
-                </dgm:shape>
-                <dgm:presOf/>
-              </dgm:layoutNode>
-              <dgm:layoutNode name="tx2" styleLbl="revTx">
-                <dgm:alg type="tx">
-                  <dgm:param type="parTxLTRAlign" val="l"/>
-                  <dgm:param type="parTxRTLAlign" val="r"/>
-                  <dgm:param type="txAnchorVert" val="t"/>
-                </dgm:alg>
-                <dgm:shape xmlns:r="http://schemas.openxmlformats.org/officeDocument/2006/relationships" type="rect" r:blip="">
-                  <dgm:adjLst/>
-                </dgm:shape>
-                <dgm:presOf axis="self"/>
-                <dgm:constrLst>
-                  <dgm:constr type="tMarg" refType="primFontSz" fact="0.3"/>
-                  <dgm:constr type="bMarg" refType="primFontSz" fact="0.3"/>
-                  <dgm:constr type="lMarg" refType="primFontSz" fact="0.3"/>
-                  <dgm:constr type="rMarg" refType="primFontSz" fact="0.3"/>
-                </dgm:constrLst>
-                <dgm:ruleLst>
-                  <dgm:rule type="primFontSz" val="5" fact="NaN" max="NaN"/>
-                </dgm:ruleLst>
-              </dgm:layoutNode>
-              <dgm:layoutNode name="vert2">
-                <dgm:choose name="Name23">
-                  <dgm:if name="Name24" func="var" arg="dir" op="equ" val="norm">
-                    <dgm:alg type="lin">
-                      <dgm:param type="linDir" val="fromT"/>
-                      <dgm:param type="nodeHorzAlign" val="l"/>
-                    </dgm:alg>
-                  </dgm:if>
-                  <dgm:else name="Name25">
-                    <dgm:alg type="lin">
-                      <dgm:param type="linDir" val="fromT"/>
-                      <dgm:param type="nodeHorzAlign" val="r"/>
-                    </dgm:alg>
-                  </dgm:else>
-                </dgm:choose>
-                <dgm:shape xmlns:r="http://schemas.openxmlformats.org/officeDocument/2006/relationships" r:blip="">
-                  <dgm:adjLst/>
-                </dgm:shape>
-                <dgm:presOf/>
-                <dgm:forEach name="Name26" axis="ch" ptType="node">
-                  <dgm:layoutNode name="horz3">
-                    <dgm:choose name="Name27">
-                      <dgm:if name="Name28" func="var" arg="dir" op="equ" val="norm">
-                        <dgm:alg type="lin">
-                          <dgm:param type="linDir" val="fromL"/>
-                          <dgm:param type="nodeVertAlign" val="t"/>
-                        </dgm:alg>
-                      </dgm:if>
-                      <dgm:else name="Name29">
-                        <dgm:alg type="lin">
-                          <dgm:param type="linDir" val="fromR"/>
-                          <dgm:param type="nodeVertAlign" val="t"/>
-                        </dgm:alg>
-                      </dgm:else>
-                    </dgm:choose>
-                    <dgm:shape xmlns:r="http://schemas.openxmlformats.org/officeDocument/2006/relationships" r:blip="">
-                      <dgm:adjLst/>
-                    </dgm:shape>
-                    <dgm:presOf/>
-                    <dgm:layoutNode name="horzSpace3">
-                      <dgm:alg type="sp"/>
-                      <dgm:shape xmlns:r="http://schemas.openxmlformats.org/officeDocument/2006/relationships" r:blip="">
-                        <dgm:adjLst/>
-                      </dgm:shape>
-                      <dgm:presOf/>
-                    </dgm:layoutNode>
-                    <dgm:layoutNode name="tx3" styleLbl="revTx">
-                      <dgm:alg type="tx">
-                        <dgm:param type="parTxLTRAlign" val="l"/>
-                        <dgm:param type="parTxRTLAlign" val="r"/>
-                        <dgm:param type="txAnchorVert" val="t"/>
-                      </dgm:alg>
-                      <dgm:shape xmlns:r="http://schemas.openxmlformats.org/officeDocument/2006/relationships" type="rect" r:blip="">
-                        <dgm:adjLst/>
-                      </dgm:shape>
-                      <dgm:presOf axis="self"/>
-                      <dgm:constrLst>
-                        <dgm:constr type="tMarg" refType="primFontSz" fact="0.3"/>
-                        <dgm:constr type="bMarg" refType="primFontSz" fact="0.3"/>
-                        <dgm:constr type="lMarg" refType="primFontSz" fact="0.3"/>
-                        <dgm:constr type="rMarg" refType="primFontSz" fact="0.3"/>
-                      </dgm:constrLst>
-                      <dgm:ruleLst>
-                        <dgm:rule type="primFontSz" val="5" fact="NaN" max="NaN"/>
-                      </dgm:ruleLst>
-                    </dgm:layoutNode>
-                    <dgm:layoutNode name="vert3">
-                      <dgm:choose name="Name30">
-                        <dgm:if name="Name31" func="var" arg="dir" op="equ" val="norm">
-                          <dgm:alg type="lin">
-                            <dgm:param type="linDir" val="fromT"/>
-                            <dgm:param type="nodeHorzAlign" val="l"/>
-                          </dgm:alg>
-                        </dgm:if>
-                        <dgm:else name="Name32">
-                          <dgm:alg type="lin">
-                            <dgm:param type="linDir" val="fromT"/>
-                            <dgm:param type="nodeHorzAlign" val="r"/>
-                          </dgm:alg>
-                        </dgm:else>
-                      </dgm:choose>
-                      <dgm:shape xmlns:r="http://schemas.openxmlformats.org/officeDocument/2006/relationships" r:blip="">
-                        <dgm:adjLst/>
-                      </dgm:shape>
-                      <dgm:presOf/>
-                      <dgm:forEach name="Name33" axis="ch" ptType="node">
-                        <dgm:layoutNode name="horz4">
-                          <dgm:choose name="Name34">
-                            <dgm:if name="Name35" func="var" arg="dir" op="equ" val="norm">
-                              <dgm:alg type="lin">
-                                <dgm:param type="linDir" val="fromL"/>
-                                <dgm:param type="nodeVertAlign" val="t"/>
-                              </dgm:alg>
-                            </dgm:if>
-                            <dgm:else name="Name36">
-                              <dgm:alg type="lin">
-                                <dgm:param type="linDir" val="fromR"/>
-                                <dgm:param type="nodeVertAlign" val="t"/>
-                              </dgm:alg>
-                            </dgm:else>
-                          </dgm:choose>
-                          <dgm:shape xmlns:r="http://schemas.openxmlformats.org/officeDocument/2006/relationships" r:blip="">
-                            <dgm:adjLst/>
-                          </dgm:shape>
-                          <dgm:presOf/>
-                          <dgm:layoutNode name="horzSpace4">
-                            <dgm:alg type="sp"/>
-                            <dgm:shape xmlns:r="http://schemas.openxmlformats.org/officeDocument/2006/relationships" r:blip="">
-                              <dgm:adjLst/>
-                            </dgm:shape>
-                            <dgm:presOf/>
-                          </dgm:layoutNode>
-                          <dgm:layoutNode name="tx4" styleLbl="revTx">
-                            <dgm:varLst>
-                              <dgm:bulletEnabled val="1"/>
-                            </dgm:varLst>
-                            <dgm:alg type="tx">
-                              <dgm:param type="parTxLTRAlign" val="l"/>
-                              <dgm:param type="parTxRTLAlign" val="r"/>
-                              <dgm:param type="txAnchorVert" val="t"/>
-                            </dgm:alg>
-                            <dgm:shape xmlns:r="http://schemas.openxmlformats.org/officeDocument/2006/relationships" type="rect" r:blip="">
-                              <dgm:adjLst/>
-                            </dgm:shape>
-                            <dgm:presOf axis="desOrSelf" ptType="node"/>
-                            <dgm:constrLst>
-                              <dgm:constr type="tMarg" refType="primFontSz" fact="0.3"/>
-                              <dgm:constr type="bMarg" refType="primFontSz" fact="0.3"/>
-                              <dgm:constr type="lMarg" refType="primFontSz" fact="0.3"/>
-                              <dgm:constr type="rMarg" refType="primFontSz" fact="0.3"/>
-                            </dgm:constrLst>
-                            <dgm:ruleLst>
-                              <dgm:rule type="primFontSz" val="5" fact="NaN" max="NaN"/>
-                            </dgm:ruleLst>
-                          </dgm:layoutNode>
-                        </dgm:layoutNode>
-                      </dgm:forEach>
-                    </dgm:layoutNode>
-                  </dgm:layoutNode>
-                  <dgm:forEach name="Name37" axis="followSib" ptType="sibTrans" cnt="1">
-                    <dgm:layoutNode name="thinLine3" styleLbl="callout">
-                      <dgm:alg type="sp"/>
-                      <dgm:shape xmlns:r="http://schemas.openxmlformats.org/officeDocument/2006/relationships" type="line" r:blip="">
-                        <dgm:adjLst/>
-                      </dgm:shape>
-                      <dgm:presOf/>
-                    </dgm:layoutNode>
-                  </dgm:forEach>
-                </dgm:forEach>
-              </dgm:layoutNode>
-            </dgm:layoutNode>
-            <dgm:layoutNode name="thinLine2b" styleLbl="callout">
-              <dgm:alg type="sp"/>
-              <dgm:shape xmlns:r="http://schemas.openxmlformats.org/officeDocument/2006/relationships" type="line" r:blip="">
-                <dgm:adjLst/>
-              </dgm:shape>
-              <dgm:presOf/>
-            </dgm:layoutNode>
-            <dgm:layoutNode name="vertSpace2b">
-              <dgm:alg type="sp"/>
-              <dgm:shape xmlns:r="http://schemas.openxmlformats.org/officeDocument/2006/relationships" r:blip="">
-                <dgm:adjLst/>
-              </dgm:shape>
-              <dgm:presOf/>
-            </dgm:layoutNode>
-          </dgm:forEach>
-        </dgm:layoutNode>
-      </dgm:layoutNode>
-    </dgm:forEach>
-  </dgm:layoutNode>
-</dgm:layoutDef>
-</file>
-
 <file path=ppt/diagrams/quickStyle1.xml><?xml version="1.0" encoding="utf-8"?>
 <dgm:styleDef xmlns:dgm="http://schemas.openxmlformats.org/drawingml/2006/diagram" xmlns:a="http://schemas.openxmlformats.org/drawingml/2006/main" uniqueId="urn:microsoft.com/office/officeart/2005/8/quickstyle/simple1">
   <dgm:title val=""/>
@@ -10262,1040 +8335,6 @@
 </file>
 
 <file path=ppt/diagrams/quickStyle3.xml><?xml version="1.0" encoding="utf-8"?>
-<dgm:styleDef xmlns:dgm="http://schemas.openxmlformats.org/drawingml/2006/diagram" xmlns:a="http://schemas.openxmlformats.org/drawingml/2006/main" uniqueId="urn:microsoft.com/office/officeart/2005/8/quickstyle/simple1">
-  <dgm:title val=""/>
-  <dgm:desc val=""/>
-  <dgm:catLst>
-    <dgm:cat type="simple" pri="10100"/>
-  </dgm:catLst>
-  <dgm:scene3d>
-    <a:camera prst="orthographicFront"/>
-    <a:lightRig rig="threePt" dir="t"/>
-  </dgm:scene3d>
-  <dgm:styleLbl name="node0">
-    <dgm:scene3d>
-      <a:camera prst="orthographicFront"/>
-      <a:lightRig rig="threePt" dir="t"/>
-    </dgm:scene3d>
-    <dgm:sp3d/>
-    <dgm:txPr/>
-    <dgm:style>
-      <a:lnRef idx="2">
-        <a:scrgbClr r="0" g="0" b="0"/>
-      </a:lnRef>
-      <a:fillRef idx="1">
-        <a:scrgbClr r="0" g="0" b="0"/>
-      </a:fillRef>
-      <a:effectRef idx="0">
-        <a:scrgbClr r="0" g="0" b="0"/>
-      </a:effectRef>
-      <a:fontRef idx="minor">
-        <a:schemeClr val="lt1"/>
-      </a:fontRef>
-    </dgm:style>
-  </dgm:styleLbl>
-  <dgm:styleLbl name="lnNode1">
-    <dgm:scene3d>
-      <a:camera prst="orthographicFront"/>
-      <a:lightRig rig="threePt" dir="t"/>
-    </dgm:scene3d>
-    <dgm:sp3d/>
-    <dgm:txPr/>
-    <dgm:style>
-      <a:lnRef idx="2">
-        <a:scrgbClr r="0" g="0" b="0"/>
-      </a:lnRef>
-      <a:fillRef idx="1">
-        <a:scrgbClr r="0" g="0" b="0"/>
-      </a:fillRef>
-      <a:effectRef idx="0">
-        <a:scrgbClr r="0" g="0" b="0"/>
-      </a:effectRef>
-      <a:fontRef idx="minor">
-        <a:schemeClr val="lt1"/>
-      </a:fontRef>
-    </dgm:style>
-  </dgm:styleLbl>
-  <dgm:styleLbl name="vennNode1">
-    <dgm:scene3d>
-      <a:camera prst="orthographicFront"/>
-      <a:lightRig rig="threePt" dir="t"/>
-    </dgm:scene3d>
-    <dgm:sp3d/>
-    <dgm:txPr/>
-    <dgm:style>
-      <a:lnRef idx="2">
-        <a:scrgbClr r="0" g="0" b="0"/>
-      </a:lnRef>
-      <a:fillRef idx="1">
-        <a:scrgbClr r="0" g="0" b="0"/>
-      </a:fillRef>
-      <a:effectRef idx="0">
-        <a:scrgbClr r="0" g="0" b="0"/>
-      </a:effectRef>
-      <a:fontRef idx="minor">
-        <a:schemeClr val="tx1"/>
-      </a:fontRef>
-    </dgm:style>
-  </dgm:styleLbl>
-  <dgm:styleLbl name="alignNode1">
-    <dgm:scene3d>
-      <a:camera prst="orthographicFront"/>
-      <a:lightRig rig="threePt" dir="t"/>
-    </dgm:scene3d>
-    <dgm:sp3d/>
-    <dgm:txPr/>
-    <dgm:style>
-      <a:lnRef idx="2">
-        <a:scrgbClr r="0" g="0" b="0"/>
-      </a:lnRef>
-      <a:fillRef idx="1">
-        <a:scrgbClr r="0" g="0" b="0"/>
-      </a:fillRef>
-      <a:effectRef idx="0">
-        <a:scrgbClr r="0" g="0" b="0"/>
-      </a:effectRef>
-      <a:fontRef idx="minor">
-        <a:schemeClr val="lt1"/>
-      </a:fontRef>
-    </dgm:style>
-  </dgm:styleLbl>
-  <dgm:styleLbl name="node1">
-    <dgm:scene3d>
-      <a:camera prst="orthographicFront"/>
-      <a:lightRig rig="threePt" dir="t"/>
-    </dgm:scene3d>
-    <dgm:sp3d/>
-    <dgm:txPr/>
-    <dgm:style>
-      <a:lnRef idx="2">
-        <a:scrgbClr r="0" g="0" b="0"/>
-      </a:lnRef>
-      <a:fillRef idx="1">
-        <a:scrgbClr r="0" g="0" b="0"/>
-      </a:fillRef>
-      <a:effectRef idx="0">
-        <a:scrgbClr r="0" g="0" b="0"/>
-      </a:effectRef>
-      <a:fontRef idx="minor">
-        <a:schemeClr val="lt1"/>
-      </a:fontRef>
-    </dgm:style>
-  </dgm:styleLbl>
-  <dgm:styleLbl name="node2">
-    <dgm:scene3d>
-      <a:camera prst="orthographicFront"/>
-      <a:lightRig rig="threePt" dir="t"/>
-    </dgm:scene3d>
-    <dgm:sp3d/>
-    <dgm:txPr/>
-    <dgm:style>
-      <a:lnRef idx="2">
-        <a:scrgbClr r="0" g="0" b="0"/>
-      </a:lnRef>
-      <a:fillRef idx="1">
-        <a:scrgbClr r="0" g="0" b="0"/>
-      </a:fillRef>
-      <a:effectRef idx="0">
-        <a:scrgbClr r="0" g="0" b="0"/>
-      </a:effectRef>
-      <a:fontRef idx="minor">
-        <a:schemeClr val="lt1"/>
-      </a:fontRef>
-    </dgm:style>
-  </dgm:styleLbl>
-  <dgm:styleLbl name="node3">
-    <dgm:scene3d>
-      <a:camera prst="orthographicFront"/>
-      <a:lightRig rig="threePt" dir="t"/>
-    </dgm:scene3d>
-    <dgm:sp3d/>
-    <dgm:txPr/>
-    <dgm:style>
-      <a:lnRef idx="2">
-        <a:scrgbClr r="0" g="0" b="0"/>
-      </a:lnRef>
-      <a:fillRef idx="1">
-        <a:scrgbClr r="0" g="0" b="0"/>
-      </a:fillRef>
-      <a:effectRef idx="0">
-        <a:scrgbClr r="0" g="0" b="0"/>
-      </a:effectRef>
-      <a:fontRef idx="minor">
-        <a:schemeClr val="lt1"/>
-      </a:fontRef>
-    </dgm:style>
-  </dgm:styleLbl>
-  <dgm:styleLbl name="node4">
-    <dgm:scene3d>
-      <a:camera prst="orthographicFront"/>
-      <a:lightRig rig="threePt" dir="t"/>
-    </dgm:scene3d>
-    <dgm:sp3d/>
-    <dgm:txPr/>
-    <dgm:style>
-      <a:lnRef idx="2">
-        <a:scrgbClr r="0" g="0" b="0"/>
-      </a:lnRef>
-      <a:fillRef idx="1">
-        <a:scrgbClr r="0" g="0" b="0"/>
-      </a:fillRef>
-      <a:effectRef idx="0">
-        <a:scrgbClr r="0" g="0" b="0"/>
-      </a:effectRef>
-      <a:fontRef idx="minor">
-        <a:schemeClr val="lt1"/>
-      </a:fontRef>
-    </dgm:style>
-  </dgm:styleLbl>
-  <dgm:styleLbl name="fgImgPlace1">
-    <dgm:scene3d>
-      <a:camera prst="orthographicFront"/>
-      <a:lightRig rig="threePt" dir="t"/>
-    </dgm:scene3d>
-    <dgm:sp3d/>
-    <dgm:txPr/>
-    <dgm:style>
-      <a:lnRef idx="2">
-        <a:scrgbClr r="0" g="0" b="0"/>
-      </a:lnRef>
-      <a:fillRef idx="1">
-        <a:scrgbClr r="0" g="0" b="0"/>
-      </a:fillRef>
-      <a:effectRef idx="0">
-        <a:scrgbClr r="0" g="0" b="0"/>
-      </a:effectRef>
-      <a:fontRef idx="minor"/>
-    </dgm:style>
-  </dgm:styleLbl>
-  <dgm:styleLbl name="alignImgPlace1">
-    <dgm:scene3d>
-      <a:camera prst="orthographicFront"/>
-      <a:lightRig rig="threePt" dir="t"/>
-    </dgm:scene3d>
-    <dgm:sp3d/>
-    <dgm:txPr/>
-    <dgm:style>
-      <a:lnRef idx="2">
-        <a:scrgbClr r="0" g="0" b="0"/>
-      </a:lnRef>
-      <a:fillRef idx="1">
-        <a:scrgbClr r="0" g="0" b="0"/>
-      </a:fillRef>
-      <a:effectRef idx="0">
-        <a:scrgbClr r="0" g="0" b="0"/>
-      </a:effectRef>
-      <a:fontRef idx="minor"/>
-    </dgm:style>
-  </dgm:styleLbl>
-  <dgm:styleLbl name="bgImgPlace1">
-    <dgm:scene3d>
-      <a:camera prst="orthographicFront"/>
-      <a:lightRig rig="threePt" dir="t"/>
-    </dgm:scene3d>
-    <dgm:sp3d/>
-    <dgm:txPr/>
-    <dgm:style>
-      <a:lnRef idx="2">
-        <a:scrgbClr r="0" g="0" b="0"/>
-      </a:lnRef>
-      <a:fillRef idx="1">
-        <a:scrgbClr r="0" g="0" b="0"/>
-      </a:fillRef>
-      <a:effectRef idx="0">
-        <a:scrgbClr r="0" g="0" b="0"/>
-      </a:effectRef>
-      <a:fontRef idx="minor"/>
-    </dgm:style>
-  </dgm:styleLbl>
-  <dgm:styleLbl name="sibTrans2D1">
-    <dgm:scene3d>
-      <a:camera prst="orthographicFront"/>
-      <a:lightRig rig="threePt" dir="t"/>
-    </dgm:scene3d>
-    <dgm:sp3d/>
-    <dgm:txPr/>
-    <dgm:style>
-      <a:lnRef idx="0">
-        <a:scrgbClr r="0" g="0" b="0"/>
-      </a:lnRef>
-      <a:fillRef idx="1">
-        <a:scrgbClr r="0" g="0" b="0"/>
-      </a:fillRef>
-      <a:effectRef idx="0">
-        <a:scrgbClr r="0" g="0" b="0"/>
-      </a:effectRef>
-      <a:fontRef idx="minor">
-        <a:schemeClr val="lt1"/>
-      </a:fontRef>
-    </dgm:style>
-  </dgm:styleLbl>
-  <dgm:styleLbl name="fgSibTrans2D1">
-    <dgm:scene3d>
-      <a:camera prst="orthographicFront"/>
-      <a:lightRig rig="threePt" dir="t"/>
-    </dgm:scene3d>
-    <dgm:sp3d/>
-    <dgm:txPr/>
-    <dgm:style>
-      <a:lnRef idx="0">
-        <a:scrgbClr r="0" g="0" b="0"/>
-      </a:lnRef>
-      <a:fillRef idx="1">
-        <a:scrgbClr r="0" g="0" b="0"/>
-      </a:fillRef>
-      <a:effectRef idx="0">
-        <a:scrgbClr r="0" g="0" b="0"/>
-      </a:effectRef>
-      <a:fontRef idx="minor">
-        <a:schemeClr val="lt1"/>
-      </a:fontRef>
-    </dgm:style>
-  </dgm:styleLbl>
-  <dgm:styleLbl name="bgSibTrans2D1">
-    <dgm:scene3d>
-      <a:camera prst="orthographicFront"/>
-      <a:lightRig rig="threePt" dir="t"/>
-    </dgm:scene3d>
-    <dgm:sp3d/>
-    <dgm:txPr/>
-    <dgm:style>
-      <a:lnRef idx="0">
-        <a:scrgbClr r="0" g="0" b="0"/>
-      </a:lnRef>
-      <a:fillRef idx="1">
-        <a:scrgbClr r="0" g="0" b="0"/>
-      </a:fillRef>
-      <a:effectRef idx="0">
-        <a:scrgbClr r="0" g="0" b="0"/>
-      </a:effectRef>
-      <a:fontRef idx="minor">
-        <a:schemeClr val="lt1"/>
-      </a:fontRef>
-    </dgm:style>
-  </dgm:styleLbl>
-  <dgm:styleLbl name="sibTrans1D1">
-    <dgm:scene3d>
-      <a:camera prst="orthographicFront"/>
-      <a:lightRig rig="threePt" dir="t"/>
-    </dgm:scene3d>
-    <dgm:sp3d/>
-    <dgm:txPr/>
-    <dgm:style>
-      <a:lnRef idx="1">
-        <a:scrgbClr r="0" g="0" b="0"/>
-      </a:lnRef>
-      <a:fillRef idx="0">
-        <a:scrgbClr r="0" g="0" b="0"/>
-      </a:fillRef>
-      <a:effectRef idx="0">
-        <a:scrgbClr r="0" g="0" b="0"/>
-      </a:effectRef>
-      <a:fontRef idx="minor"/>
-    </dgm:style>
-  </dgm:styleLbl>
-  <dgm:styleLbl name="callout">
-    <dgm:scene3d>
-      <a:camera prst="orthographicFront"/>
-      <a:lightRig rig="threePt" dir="t"/>
-    </dgm:scene3d>
-    <dgm:sp3d/>
-    <dgm:txPr/>
-    <dgm:style>
-      <a:lnRef idx="2">
-        <a:scrgbClr r="0" g="0" b="0"/>
-      </a:lnRef>
-      <a:fillRef idx="1">
-        <a:scrgbClr r="0" g="0" b="0"/>
-      </a:fillRef>
-      <a:effectRef idx="0">
-        <a:scrgbClr r="0" g="0" b="0"/>
-      </a:effectRef>
-      <a:fontRef idx="minor"/>
-    </dgm:style>
-  </dgm:styleLbl>
-  <dgm:styleLbl name="asst0">
-    <dgm:scene3d>
-      <a:camera prst="orthographicFront"/>
-      <a:lightRig rig="threePt" dir="t"/>
-    </dgm:scene3d>
-    <dgm:sp3d/>
-    <dgm:txPr/>
-    <dgm:style>
-      <a:lnRef idx="2">
-        <a:scrgbClr r="0" g="0" b="0"/>
-      </a:lnRef>
-      <a:fillRef idx="1">
-        <a:scrgbClr r="0" g="0" b="0"/>
-      </a:fillRef>
-      <a:effectRef idx="0">
-        <a:scrgbClr r="0" g="0" b="0"/>
-      </a:effectRef>
-      <a:fontRef idx="minor">
-        <a:schemeClr val="lt1"/>
-      </a:fontRef>
-    </dgm:style>
-  </dgm:styleLbl>
-  <dgm:styleLbl name="asst1">
-    <dgm:scene3d>
-      <a:camera prst="orthographicFront"/>
-      <a:lightRig rig="threePt" dir="t"/>
-    </dgm:scene3d>
-    <dgm:sp3d/>
-    <dgm:txPr/>
-    <dgm:style>
-      <a:lnRef idx="2">
-        <a:scrgbClr r="0" g="0" b="0"/>
-      </a:lnRef>
-      <a:fillRef idx="1">
-        <a:scrgbClr r="0" g="0" b="0"/>
-      </a:fillRef>
-      <a:effectRef idx="0">
-        <a:scrgbClr r="0" g="0" b="0"/>
-      </a:effectRef>
-      <a:fontRef idx="minor">
-        <a:schemeClr val="lt1"/>
-      </a:fontRef>
-    </dgm:style>
-  </dgm:styleLbl>
-  <dgm:styleLbl name="asst2">
-    <dgm:scene3d>
-      <a:camera prst="orthographicFront"/>
-      <a:lightRig rig="threePt" dir="t"/>
-    </dgm:scene3d>
-    <dgm:sp3d/>
-    <dgm:txPr/>
-    <dgm:style>
-      <a:lnRef idx="2">
-        <a:scrgbClr r="0" g="0" b="0"/>
-      </a:lnRef>
-      <a:fillRef idx="1">
-        <a:scrgbClr r="0" g="0" b="0"/>
-      </a:fillRef>
-      <a:effectRef idx="0">
-        <a:scrgbClr r="0" g="0" b="0"/>
-      </a:effectRef>
-      <a:fontRef idx="minor">
-        <a:schemeClr val="lt1"/>
-      </a:fontRef>
-    </dgm:style>
-  </dgm:styleLbl>
-  <dgm:styleLbl name="asst3">
-    <dgm:scene3d>
-      <a:camera prst="orthographicFront"/>
-      <a:lightRig rig="threePt" dir="t"/>
-    </dgm:scene3d>
-    <dgm:sp3d/>
-    <dgm:txPr/>
-    <dgm:style>
-      <a:lnRef idx="2">
-        <a:scrgbClr r="0" g="0" b="0"/>
-      </a:lnRef>
-      <a:fillRef idx="1">
-        <a:scrgbClr r="0" g="0" b="0"/>
-      </a:fillRef>
-      <a:effectRef idx="0">
-        <a:scrgbClr r="0" g="0" b="0"/>
-      </a:effectRef>
-      <a:fontRef idx="minor">
-        <a:schemeClr val="lt1"/>
-      </a:fontRef>
-    </dgm:style>
-  </dgm:styleLbl>
-  <dgm:styleLbl name="asst4">
-    <dgm:scene3d>
-      <a:camera prst="orthographicFront"/>
-      <a:lightRig rig="threePt" dir="t"/>
-    </dgm:scene3d>
-    <dgm:sp3d/>
-    <dgm:txPr/>
-    <dgm:style>
-      <a:lnRef idx="2">
-        <a:scrgbClr r="0" g="0" b="0"/>
-      </a:lnRef>
-      <a:fillRef idx="1">
-        <a:scrgbClr r="0" g="0" b="0"/>
-      </a:fillRef>
-      <a:effectRef idx="0">
-        <a:scrgbClr r="0" g="0" b="0"/>
-      </a:effectRef>
-      <a:fontRef idx="minor">
-        <a:schemeClr val="lt1"/>
-      </a:fontRef>
-    </dgm:style>
-  </dgm:styleLbl>
-  <dgm:styleLbl name="parChTrans2D1">
-    <dgm:scene3d>
-      <a:camera prst="orthographicFront"/>
-      <a:lightRig rig="threePt" dir="t"/>
-    </dgm:scene3d>
-    <dgm:sp3d/>
-    <dgm:txPr/>
-    <dgm:style>
-      <a:lnRef idx="2">
-        <a:scrgbClr r="0" g="0" b="0"/>
-      </a:lnRef>
-      <a:fillRef idx="1">
-        <a:scrgbClr r="0" g="0" b="0"/>
-      </a:fillRef>
-      <a:effectRef idx="0">
-        <a:scrgbClr r="0" g="0" b="0"/>
-      </a:effectRef>
-      <a:fontRef idx="minor">
-        <a:schemeClr val="lt1"/>
-      </a:fontRef>
-    </dgm:style>
-  </dgm:styleLbl>
-  <dgm:styleLbl name="parChTrans2D2">
-    <dgm:scene3d>
-      <a:camera prst="orthographicFront"/>
-      <a:lightRig rig="threePt" dir="t"/>
-    </dgm:scene3d>
-    <dgm:sp3d/>
-    <dgm:txPr/>
-    <dgm:style>
-      <a:lnRef idx="2">
-        <a:scrgbClr r="0" g="0" b="0"/>
-      </a:lnRef>
-      <a:fillRef idx="1">
-        <a:scrgbClr r="0" g="0" b="0"/>
-      </a:fillRef>
-      <a:effectRef idx="0">
-        <a:scrgbClr r="0" g="0" b="0"/>
-      </a:effectRef>
-      <a:fontRef idx="minor">
-        <a:schemeClr val="lt1"/>
-      </a:fontRef>
-    </dgm:style>
-  </dgm:styleLbl>
-  <dgm:styleLbl name="parChTrans2D3">
-    <dgm:scene3d>
-      <a:camera prst="orthographicFront"/>
-      <a:lightRig rig="threePt" dir="t"/>
-    </dgm:scene3d>
-    <dgm:sp3d/>
-    <dgm:txPr/>
-    <dgm:style>
-      <a:lnRef idx="2">
-        <a:scrgbClr r="0" g="0" b="0"/>
-      </a:lnRef>
-      <a:fillRef idx="1">
-        <a:scrgbClr r="0" g="0" b="0"/>
-      </a:fillRef>
-      <a:effectRef idx="0">
-        <a:scrgbClr r="0" g="0" b="0"/>
-      </a:effectRef>
-      <a:fontRef idx="minor">
-        <a:schemeClr val="lt1"/>
-      </a:fontRef>
-    </dgm:style>
-  </dgm:styleLbl>
-  <dgm:styleLbl name="parChTrans2D4">
-    <dgm:scene3d>
-      <a:camera prst="orthographicFront"/>
-      <a:lightRig rig="threePt" dir="t"/>
-    </dgm:scene3d>
-    <dgm:sp3d/>
-    <dgm:txPr/>
-    <dgm:style>
-      <a:lnRef idx="2">
-        <a:scrgbClr r="0" g="0" b="0"/>
-      </a:lnRef>
-      <a:fillRef idx="1">
-        <a:scrgbClr r="0" g="0" b="0"/>
-      </a:fillRef>
-      <a:effectRef idx="0">
-        <a:scrgbClr r="0" g="0" b="0"/>
-      </a:effectRef>
-      <a:fontRef idx="minor">
-        <a:schemeClr val="lt1"/>
-      </a:fontRef>
-    </dgm:style>
-  </dgm:styleLbl>
-  <dgm:styleLbl name="parChTrans1D1">
-    <dgm:scene3d>
-      <a:camera prst="orthographicFront"/>
-      <a:lightRig rig="threePt" dir="t"/>
-    </dgm:scene3d>
-    <dgm:sp3d/>
-    <dgm:txPr/>
-    <dgm:style>
-      <a:lnRef idx="2">
-        <a:scrgbClr r="0" g="0" b="0"/>
-      </a:lnRef>
-      <a:fillRef idx="0">
-        <a:scrgbClr r="0" g="0" b="0"/>
-      </a:fillRef>
-      <a:effectRef idx="0">
-        <a:scrgbClr r="0" g="0" b="0"/>
-      </a:effectRef>
-      <a:fontRef idx="minor"/>
-    </dgm:style>
-  </dgm:styleLbl>
-  <dgm:styleLbl name="parChTrans1D2">
-    <dgm:scene3d>
-      <a:camera prst="orthographicFront"/>
-      <a:lightRig rig="threePt" dir="t"/>
-    </dgm:scene3d>
-    <dgm:sp3d/>
-    <dgm:txPr/>
-    <dgm:style>
-      <a:lnRef idx="2">
-        <a:scrgbClr r="0" g="0" b="0"/>
-      </a:lnRef>
-      <a:fillRef idx="0">
-        <a:scrgbClr r="0" g="0" b="0"/>
-      </a:fillRef>
-      <a:effectRef idx="0">
-        <a:scrgbClr r="0" g="0" b="0"/>
-      </a:effectRef>
-      <a:fontRef idx="minor"/>
-    </dgm:style>
-  </dgm:styleLbl>
-  <dgm:styleLbl name="parChTrans1D3">
-    <dgm:scene3d>
-      <a:camera prst="orthographicFront"/>
-      <a:lightRig rig="threePt" dir="t"/>
-    </dgm:scene3d>
-    <dgm:sp3d/>
-    <dgm:txPr/>
-    <dgm:style>
-      <a:lnRef idx="2">
-        <a:scrgbClr r="0" g="0" b="0"/>
-      </a:lnRef>
-      <a:fillRef idx="0">
-        <a:scrgbClr r="0" g="0" b="0"/>
-      </a:fillRef>
-      <a:effectRef idx="0">
-        <a:scrgbClr r="0" g="0" b="0"/>
-      </a:effectRef>
-      <a:fontRef idx="minor"/>
-    </dgm:style>
-  </dgm:styleLbl>
-  <dgm:styleLbl name="parChTrans1D4">
-    <dgm:scene3d>
-      <a:camera prst="orthographicFront"/>
-      <a:lightRig rig="threePt" dir="t"/>
-    </dgm:scene3d>
-    <dgm:sp3d/>
-    <dgm:txPr/>
-    <dgm:style>
-      <a:lnRef idx="2">
-        <a:scrgbClr r="0" g="0" b="0"/>
-      </a:lnRef>
-      <a:fillRef idx="0">
-        <a:scrgbClr r="0" g="0" b="0"/>
-      </a:fillRef>
-      <a:effectRef idx="0">
-        <a:scrgbClr r="0" g="0" b="0"/>
-      </a:effectRef>
-      <a:fontRef idx="minor"/>
-    </dgm:style>
-  </dgm:styleLbl>
-  <dgm:styleLbl name="fgAcc1">
-    <dgm:scene3d>
-      <a:camera prst="orthographicFront"/>
-      <a:lightRig rig="threePt" dir="t"/>
-    </dgm:scene3d>
-    <dgm:sp3d/>
-    <dgm:txPr/>
-    <dgm:style>
-      <a:lnRef idx="2">
-        <a:scrgbClr r="0" g="0" b="0"/>
-      </a:lnRef>
-      <a:fillRef idx="1">
-        <a:scrgbClr r="0" g="0" b="0"/>
-      </a:fillRef>
-      <a:effectRef idx="0">
-        <a:scrgbClr r="0" g="0" b="0"/>
-      </a:effectRef>
-      <a:fontRef idx="minor"/>
-    </dgm:style>
-  </dgm:styleLbl>
-  <dgm:styleLbl name="conFgAcc1">
-    <dgm:scene3d>
-      <a:camera prst="orthographicFront"/>
-      <a:lightRig rig="threePt" dir="t"/>
-    </dgm:scene3d>
-    <dgm:sp3d/>
-    <dgm:txPr/>
-    <dgm:style>
-      <a:lnRef idx="2">
-        <a:scrgbClr r="0" g="0" b="0"/>
-      </a:lnRef>
-      <a:fillRef idx="1">
-        <a:scrgbClr r="0" g="0" b="0"/>
-      </a:fillRef>
-      <a:effectRef idx="0">
-        <a:scrgbClr r="0" g="0" b="0"/>
-      </a:effectRef>
-      <a:fontRef idx="minor"/>
-    </dgm:style>
-  </dgm:styleLbl>
-  <dgm:styleLbl name="alignAcc1">
-    <dgm:scene3d>
-      <a:camera prst="orthographicFront"/>
-      <a:lightRig rig="threePt" dir="t"/>
-    </dgm:scene3d>
-    <dgm:sp3d/>
-    <dgm:txPr/>
-    <dgm:style>
-      <a:lnRef idx="2">
-        <a:scrgbClr r="0" g="0" b="0"/>
-      </a:lnRef>
-      <a:fillRef idx="1">
-        <a:scrgbClr r="0" g="0" b="0"/>
-      </a:fillRef>
-      <a:effectRef idx="0">
-        <a:scrgbClr r="0" g="0" b="0"/>
-      </a:effectRef>
-      <a:fontRef idx="minor"/>
-    </dgm:style>
-  </dgm:styleLbl>
-  <dgm:styleLbl name="trAlignAcc1">
-    <dgm:scene3d>
-      <a:camera prst="orthographicFront"/>
-      <a:lightRig rig="threePt" dir="t"/>
-    </dgm:scene3d>
-    <dgm:sp3d/>
-    <dgm:txPr/>
-    <dgm:style>
-      <a:lnRef idx="1">
-        <a:scrgbClr r="0" g="0" b="0"/>
-      </a:lnRef>
-      <a:fillRef idx="1">
-        <a:scrgbClr r="0" g="0" b="0"/>
-      </a:fillRef>
-      <a:effectRef idx="0">
-        <a:scrgbClr r="0" g="0" b="0"/>
-      </a:effectRef>
-      <a:fontRef idx="minor"/>
-    </dgm:style>
-  </dgm:styleLbl>
-  <dgm:styleLbl name="bgAcc1">
-    <dgm:scene3d>
-      <a:camera prst="orthographicFront"/>
-      <a:lightRig rig="threePt" dir="t"/>
-    </dgm:scene3d>
-    <dgm:sp3d/>
-    <dgm:txPr/>
-    <dgm:style>
-      <a:lnRef idx="2">
-        <a:scrgbClr r="0" g="0" b="0"/>
-      </a:lnRef>
-      <a:fillRef idx="1">
-        <a:scrgbClr r="0" g="0" b="0"/>
-      </a:fillRef>
-      <a:effectRef idx="0">
-        <a:scrgbClr r="0" g="0" b="0"/>
-      </a:effectRef>
-      <a:fontRef idx="minor"/>
-    </dgm:style>
-  </dgm:styleLbl>
-  <dgm:styleLbl name="solidFgAcc1">
-    <dgm:scene3d>
-      <a:camera prst="orthographicFront"/>
-      <a:lightRig rig="threePt" dir="t"/>
-    </dgm:scene3d>
-    <dgm:sp3d/>
-    <dgm:txPr/>
-    <dgm:style>
-      <a:lnRef idx="2">
-        <a:scrgbClr r="0" g="0" b="0"/>
-      </a:lnRef>
-      <a:fillRef idx="1">
-        <a:scrgbClr r="0" g="0" b="0"/>
-      </a:fillRef>
-      <a:effectRef idx="0">
-        <a:scrgbClr r="0" g="0" b="0"/>
-      </a:effectRef>
-      <a:fontRef idx="minor"/>
-    </dgm:style>
-  </dgm:styleLbl>
-  <dgm:styleLbl name="solidAlignAcc1">
-    <dgm:scene3d>
-      <a:camera prst="orthographicFront"/>
-      <a:lightRig rig="threePt" dir="t"/>
-    </dgm:scene3d>
-    <dgm:sp3d/>
-    <dgm:txPr/>
-    <dgm:style>
-      <a:lnRef idx="2">
-        <a:scrgbClr r="0" g="0" b="0"/>
-      </a:lnRef>
-      <a:fillRef idx="1">
-        <a:scrgbClr r="0" g="0" b="0"/>
-      </a:fillRef>
-      <a:effectRef idx="0">
-        <a:scrgbClr r="0" g="0" b="0"/>
-      </a:effectRef>
-      <a:fontRef idx="minor"/>
-    </dgm:style>
-  </dgm:styleLbl>
-  <dgm:styleLbl name="solidBgAcc1">
-    <dgm:scene3d>
-      <a:camera prst="orthographicFront"/>
-      <a:lightRig rig="threePt" dir="t"/>
-    </dgm:scene3d>
-    <dgm:sp3d/>
-    <dgm:txPr/>
-    <dgm:style>
-      <a:lnRef idx="2">
-        <a:scrgbClr r="0" g="0" b="0"/>
-      </a:lnRef>
-      <a:fillRef idx="1">
-        <a:scrgbClr r="0" g="0" b="0"/>
-      </a:fillRef>
-      <a:effectRef idx="0">
-        <a:scrgbClr r="0" g="0" b="0"/>
-      </a:effectRef>
-      <a:fontRef idx="minor"/>
-    </dgm:style>
-  </dgm:styleLbl>
-  <dgm:styleLbl name="fgAccFollowNode1">
-    <dgm:scene3d>
-      <a:camera prst="orthographicFront"/>
-      <a:lightRig rig="threePt" dir="t"/>
-    </dgm:scene3d>
-    <dgm:sp3d/>
-    <dgm:txPr/>
-    <dgm:style>
-      <a:lnRef idx="2">
-        <a:scrgbClr r="0" g="0" b="0"/>
-      </a:lnRef>
-      <a:fillRef idx="1">
-        <a:scrgbClr r="0" g="0" b="0"/>
-      </a:fillRef>
-      <a:effectRef idx="0">
-        <a:scrgbClr r="0" g="0" b="0"/>
-      </a:effectRef>
-      <a:fontRef idx="minor"/>
-    </dgm:style>
-  </dgm:styleLbl>
-  <dgm:styleLbl name="alignAccFollowNode1">
-    <dgm:scene3d>
-      <a:camera prst="orthographicFront"/>
-      <a:lightRig rig="threePt" dir="t"/>
-    </dgm:scene3d>
-    <dgm:sp3d/>
-    <dgm:txPr/>
-    <dgm:style>
-      <a:lnRef idx="2">
-        <a:scrgbClr r="0" g="0" b="0"/>
-      </a:lnRef>
-      <a:fillRef idx="1">
-        <a:scrgbClr r="0" g="0" b="0"/>
-      </a:fillRef>
-      <a:effectRef idx="0">
-        <a:scrgbClr r="0" g="0" b="0"/>
-      </a:effectRef>
-      <a:fontRef idx="minor"/>
-    </dgm:style>
-  </dgm:styleLbl>
-  <dgm:styleLbl name="bgAccFollowNode1">
-    <dgm:scene3d>
-      <a:camera prst="orthographicFront"/>
-      <a:lightRig rig="threePt" dir="t"/>
-    </dgm:scene3d>
-    <dgm:sp3d/>
-    <dgm:txPr/>
-    <dgm:style>
-      <a:lnRef idx="2">
-        <a:scrgbClr r="0" g="0" b="0"/>
-      </a:lnRef>
-      <a:fillRef idx="1">
-        <a:scrgbClr r="0" g="0" b="0"/>
-      </a:fillRef>
-      <a:effectRef idx="0">
-        <a:scrgbClr r="0" g="0" b="0"/>
-      </a:effectRef>
-      <a:fontRef idx="minor"/>
-    </dgm:style>
-  </dgm:styleLbl>
-  <dgm:styleLbl name="fgAcc0">
-    <dgm:scene3d>
-      <a:camera prst="orthographicFront"/>
-      <a:lightRig rig="threePt" dir="t"/>
-    </dgm:scene3d>
-    <dgm:sp3d/>
-    <dgm:txPr/>
-    <dgm:style>
-      <a:lnRef idx="2">
-        <a:scrgbClr r="0" g="0" b="0"/>
-      </a:lnRef>
-      <a:fillRef idx="1">
-        <a:scrgbClr r="0" g="0" b="0"/>
-      </a:fillRef>
-      <a:effectRef idx="0">
-        <a:scrgbClr r="0" g="0" b="0"/>
-      </a:effectRef>
-      <a:fontRef idx="minor"/>
-    </dgm:style>
-  </dgm:styleLbl>
-  <dgm:styleLbl name="fgAcc2">
-    <dgm:scene3d>
-      <a:camera prst="orthographicFront"/>
-      <a:lightRig rig="threePt" dir="t"/>
-    </dgm:scene3d>
-    <dgm:sp3d/>
-    <dgm:txPr/>
-    <dgm:style>
-      <a:lnRef idx="2">
-        <a:scrgbClr r="0" g="0" b="0"/>
-      </a:lnRef>
-      <a:fillRef idx="1">
-        <a:scrgbClr r="0" g="0" b="0"/>
-      </a:fillRef>
-      <a:effectRef idx="0">
-        <a:scrgbClr r="0" g="0" b="0"/>
-      </a:effectRef>
-      <a:fontRef idx="minor"/>
-    </dgm:style>
-  </dgm:styleLbl>
-  <dgm:styleLbl name="fgAcc3">
-    <dgm:scene3d>
-      <a:camera prst="orthographicFront"/>
-      <a:lightRig rig="threePt" dir="t"/>
-    </dgm:scene3d>
-    <dgm:sp3d/>
-    <dgm:txPr/>
-    <dgm:style>
-      <a:lnRef idx="2">
-        <a:scrgbClr r="0" g="0" b="0"/>
-      </a:lnRef>
-      <a:fillRef idx="1">
-        <a:scrgbClr r="0" g="0" b="0"/>
-      </a:fillRef>
-      <a:effectRef idx="0">
-        <a:scrgbClr r="0" g="0" b="0"/>
-      </a:effectRef>
-      <a:fontRef idx="minor"/>
-    </dgm:style>
-  </dgm:styleLbl>
-  <dgm:styleLbl name="fgAcc4">
-    <dgm:scene3d>
-      <a:camera prst="orthographicFront"/>
-      <a:lightRig rig="threePt" dir="t"/>
-    </dgm:scene3d>
-    <dgm:sp3d/>
-    <dgm:txPr/>
-    <dgm:style>
-      <a:lnRef idx="2">
-        <a:scrgbClr r="0" g="0" b="0"/>
-      </a:lnRef>
-      <a:fillRef idx="1">
-        <a:scrgbClr r="0" g="0" b="0"/>
-      </a:fillRef>
-      <a:effectRef idx="0">
-        <a:scrgbClr r="0" g="0" b="0"/>
-      </a:effectRef>
-      <a:fontRef idx="minor"/>
-    </dgm:style>
-  </dgm:styleLbl>
-  <dgm:styleLbl name="bgShp">
-    <dgm:scene3d>
-      <a:camera prst="orthographicFront"/>
-      <a:lightRig rig="threePt" dir="t"/>
-    </dgm:scene3d>
-    <dgm:sp3d/>
-    <dgm:txPr/>
-    <dgm:style>
-      <a:lnRef idx="0">
-        <a:scrgbClr r="0" g="0" b="0"/>
-      </a:lnRef>
-      <a:fillRef idx="1">
-        <a:scrgbClr r="0" g="0" b="0"/>
-      </a:fillRef>
-      <a:effectRef idx="0">
-        <a:scrgbClr r="0" g="0" b="0"/>
-      </a:effectRef>
-      <a:fontRef idx="minor"/>
-    </dgm:style>
-  </dgm:styleLbl>
-  <dgm:styleLbl name="dkBgShp">
-    <dgm:scene3d>
-      <a:camera prst="orthographicFront"/>
-      <a:lightRig rig="threePt" dir="t"/>
-    </dgm:scene3d>
-    <dgm:sp3d/>
-    <dgm:txPr/>
-    <dgm:style>
-      <a:lnRef idx="0">
-        <a:scrgbClr r="0" g="0" b="0"/>
-      </a:lnRef>
-      <a:fillRef idx="1">
-        <a:scrgbClr r="0" g="0" b="0"/>
-      </a:fillRef>
-      <a:effectRef idx="0">
-        <a:scrgbClr r="0" g="0" b="0"/>
-      </a:effectRef>
-      <a:fontRef idx="minor"/>
-    </dgm:style>
-  </dgm:styleLbl>
-  <dgm:styleLbl name="trBgShp">
-    <dgm:scene3d>
-      <a:camera prst="orthographicFront"/>
-      <a:lightRig rig="threePt" dir="t"/>
-    </dgm:scene3d>
-    <dgm:sp3d/>
-    <dgm:txPr/>
-    <dgm:style>
-      <a:lnRef idx="0">
-        <a:scrgbClr r="0" g="0" b="0"/>
-      </a:lnRef>
-      <a:fillRef idx="1">
-        <a:scrgbClr r="0" g="0" b="0"/>
-      </a:fillRef>
-      <a:effectRef idx="0">
-        <a:scrgbClr r="0" g="0" b="0"/>
-      </a:effectRef>
-      <a:fontRef idx="minor"/>
-    </dgm:style>
-  </dgm:styleLbl>
-  <dgm:styleLbl name="fgShp">
-    <dgm:scene3d>
-      <a:camera prst="orthographicFront"/>
-      <a:lightRig rig="threePt" dir="t"/>
-    </dgm:scene3d>
-    <dgm:sp3d/>
-    <dgm:txPr/>
-    <dgm:style>
-      <a:lnRef idx="2">
-        <a:scrgbClr r="0" g="0" b="0"/>
-      </a:lnRef>
-      <a:fillRef idx="1">
-        <a:scrgbClr r="0" g="0" b="0"/>
-      </a:fillRef>
-      <a:effectRef idx="0">
-        <a:scrgbClr r="0" g="0" b="0"/>
-      </a:effectRef>
-      <a:fontRef idx="minor"/>
-    </dgm:style>
-  </dgm:styleLbl>
-  <dgm:styleLbl name="revTx">
-    <dgm:scene3d>
-      <a:camera prst="orthographicFront"/>
-      <a:lightRig rig="threePt" dir="t"/>
-    </dgm:scene3d>
-    <dgm:sp3d/>
-    <dgm:txPr/>
-    <dgm:style>
-      <a:lnRef idx="0">
-        <a:scrgbClr r="0" g="0" b="0"/>
-      </a:lnRef>
-      <a:fillRef idx="0">
-        <a:scrgbClr r="0" g="0" b="0"/>
-      </a:fillRef>
-      <a:effectRef idx="0">
-        <a:scrgbClr r="0" g="0" b="0"/>
-      </a:effectRef>
-      <a:fontRef idx="minor"/>
-    </dgm:style>
-  </dgm:styleLbl>
-</dgm:styleDef>
-</file>
-
-<file path=ppt/diagrams/quickStyle4.xml><?xml version="1.0" encoding="utf-8"?>
 <dgm:styleDef xmlns:dgm="http://schemas.openxmlformats.org/drawingml/2006/diagram" xmlns:a="http://schemas.openxmlformats.org/drawingml/2006/main" uniqueId="urn:microsoft.com/office/officeart/2005/8/quickstyle/simple1">
   <dgm:title val=""/>
   <dgm:desc val=""/>
@@ -17320,793 +14359,6 @@
 </p:sld>
 </file>
 
-<file path=ppt/slides/slide12.xml><?xml version="1.0" encoding="utf-8"?>
-<p:sld xmlns:a="http://schemas.openxmlformats.org/drawingml/2006/main" xmlns:r="http://schemas.openxmlformats.org/officeDocument/2006/relationships" xmlns:p="http://schemas.openxmlformats.org/presentationml/2006/main">
-  <p:cSld>
-    <p:spTree>
-      <p:nvGrpSpPr>
-        <p:cNvPr id="1" name=""/>
-        <p:cNvGrpSpPr/>
-        <p:nvPr/>
-      </p:nvGrpSpPr>
-      <p:grpSpPr>
-        <a:xfrm>
-          <a:off x="0" y="0"/>
-          <a:ext cx="0" cy="0"/>
-          <a:chOff x="0" y="0"/>
-          <a:chExt cx="0" cy="0"/>
-        </a:xfrm>
-      </p:grpSpPr>
-      <p:sp>
-        <p:nvSpPr>
-          <p:cNvPr id="2" name="Title 1">
-            <a:extLst>
-              <a:ext uri="{FF2B5EF4-FFF2-40B4-BE49-F238E27FC236}">
-                <a16:creationId xmlns:a16="http://schemas.microsoft.com/office/drawing/2014/main" id="{78C388EE-BC90-466E-9E05-85AAE9B6C86D}"/>
-              </a:ext>
-            </a:extLst>
-          </p:cNvPr>
-          <p:cNvSpPr>
-            <a:spLocks noGrp="1"/>
-          </p:cNvSpPr>
-          <p:nvPr>
-            <p:ph type="title"/>
-          </p:nvPr>
-        </p:nvSpPr>
-        <p:spPr/>
-        <p:txBody>
-          <a:bodyPr/>
-          <a:lstStyle/>
-          <a:p>
-            <a:endParaRPr lang="en-US"/>
-          </a:p>
-        </p:txBody>
-      </p:sp>
-      <p:sp>
-        <p:nvSpPr>
-          <p:cNvPr id="3" name="Content Placeholder 2">
-            <a:extLst>
-              <a:ext uri="{FF2B5EF4-FFF2-40B4-BE49-F238E27FC236}">
-                <a16:creationId xmlns:a16="http://schemas.microsoft.com/office/drawing/2014/main" id="{710DAD66-2021-49A1-B33F-5BDD58F3E791}"/>
-              </a:ext>
-            </a:extLst>
-          </p:cNvPr>
-          <p:cNvSpPr>
-            <a:spLocks noGrp="1"/>
-          </p:cNvSpPr>
-          <p:nvPr>
-            <p:ph idx="1"/>
-          </p:nvPr>
-        </p:nvSpPr>
-        <p:spPr/>
-        <p:txBody>
-          <a:bodyPr/>
-          <a:lstStyle/>
-          <a:p>
-            <a:endParaRPr lang="en-US"/>
-          </a:p>
-        </p:txBody>
-      </p:sp>
-    </p:spTree>
-    <p:extLst>
-      <p:ext uri="{BB962C8B-B14F-4D97-AF65-F5344CB8AC3E}">
-        <p14:creationId xmlns:p14="http://schemas.microsoft.com/office/powerpoint/2010/main" val="4129231622"/>
-      </p:ext>
-    </p:extLst>
-  </p:cSld>
-  <p:clrMapOvr>
-    <a:masterClrMapping/>
-  </p:clrMapOvr>
-</p:sld>
-</file>
-
-<file path=ppt/slides/slide13.xml><?xml version="1.0" encoding="utf-8"?>
-<p:sld xmlns:a="http://schemas.openxmlformats.org/drawingml/2006/main" xmlns:r="http://schemas.openxmlformats.org/officeDocument/2006/relationships" xmlns:p="http://schemas.openxmlformats.org/presentationml/2006/main">
-  <p:cSld>
-    <p:bg>
-      <p:bgPr>
-        <a:solidFill>
-          <a:schemeClr val="bg1"/>
-        </a:solidFill>
-        <a:effectLst/>
-      </p:bgPr>
-    </p:bg>
-    <p:spTree>
-      <p:nvGrpSpPr>
-        <p:cNvPr id="1" name=""/>
-        <p:cNvGrpSpPr/>
-        <p:nvPr/>
-      </p:nvGrpSpPr>
-      <p:grpSpPr>
-        <a:xfrm>
-          <a:off x="0" y="0"/>
-          <a:ext cx="0" cy="0"/>
-          <a:chOff x="0" y="0"/>
-          <a:chExt cx="0" cy="0"/>
-        </a:xfrm>
-      </p:grpSpPr>
-      <p:sp>
-        <p:nvSpPr>
-          <p:cNvPr id="66" name="Freeform: Shape 56">
-            <a:extLst>
-              <a:ext uri="{FF2B5EF4-FFF2-40B4-BE49-F238E27FC236}">
-                <a16:creationId xmlns:a16="http://schemas.microsoft.com/office/drawing/2014/main" id="{42285737-90EE-47DC-AC80-8AE156B11969}"/>
-              </a:ext>
-              <a:ext uri="{C183D7F6-B498-43B3-948B-1728B52AA6E4}">
-                <adec:decorative xmlns:adec="http://schemas.microsoft.com/office/drawing/2017/decorative" val="1"/>
-              </a:ext>
-            </a:extLst>
-          </p:cNvPr>
-          <p:cNvSpPr>
-            <a:spLocks noGrp="1" noRot="1" noChangeAspect="1" noMove="1" noResize="1" noEditPoints="1" noAdjustHandles="1" noChangeArrowheads="1" noChangeShapeType="1" noTextEdit="1"/>
-          </p:cNvSpPr>
-          <p:nvPr>
-            <p:extLst>
-              <p:ext uri="{386F3935-93C4-4BCD-93E2-E3B085C9AB24}">
-                <p16:designElem xmlns:p16="http://schemas.microsoft.com/office/powerpoint/2015/main" val="1"/>
-              </p:ext>
-            </p:extLst>
-          </p:nvPr>
-        </p:nvSpPr>
-        <p:spPr>
-          <a:xfrm flipV="1">
-            <a:off x="-1" y="-1"/>
-            <a:ext cx="4403709" cy="6858001"/>
-          </a:xfrm>
-          <a:custGeom>
-            <a:avLst/>
-            <a:gdLst>
-              <a:gd name="connsiteX0" fmla="*/ 3223890 w 4403709"/>
-              <a:gd name="connsiteY0" fmla="*/ 6858001 h 6858001"/>
-              <a:gd name="connsiteX1" fmla="*/ 4101908 w 4403709"/>
-              <a:gd name="connsiteY1" fmla="*/ 6858001 h 6858001"/>
-              <a:gd name="connsiteX2" fmla="*/ 3254950 w 4403709"/>
-              <a:gd name="connsiteY2" fmla="*/ 1599356 h 6858001"/>
-              <a:gd name="connsiteX3" fmla="*/ 3254950 w 4403709"/>
-              <a:gd name="connsiteY3" fmla="*/ 1594062 h 6858001"/>
-              <a:gd name="connsiteX4" fmla="*/ 4403709 w 4403709"/>
-              <a:gd name="connsiteY4" fmla="*/ 0 h 6858001"/>
-              <a:gd name="connsiteX5" fmla="*/ 3254950 w 4403709"/>
-              <a:gd name="connsiteY5" fmla="*/ 0 h 6858001"/>
-              <a:gd name="connsiteX6" fmla="*/ 2903520 w 4403709"/>
-              <a:gd name="connsiteY6" fmla="*/ 0 h 6858001"/>
-              <a:gd name="connsiteX7" fmla="*/ 0 w 4403709"/>
-              <a:gd name="connsiteY7" fmla="*/ 0 h 6858001"/>
-              <a:gd name="connsiteX8" fmla="*/ 0 w 4403709"/>
-              <a:gd name="connsiteY8" fmla="*/ 6858000 h 6858001"/>
-              <a:gd name="connsiteX9" fmla="*/ 3223890 w 4403709"/>
-              <a:gd name="connsiteY9" fmla="*/ 6858000 h 6858001"/>
-            </a:gdLst>
-            <a:ahLst/>
-            <a:cxnLst>
-              <a:cxn ang="0">
-                <a:pos x="connsiteX0" y="connsiteY0"/>
-              </a:cxn>
-              <a:cxn ang="0">
-                <a:pos x="connsiteX1" y="connsiteY1"/>
-              </a:cxn>
-              <a:cxn ang="0">
-                <a:pos x="connsiteX2" y="connsiteY2"/>
-              </a:cxn>
-              <a:cxn ang="0">
-                <a:pos x="connsiteX3" y="connsiteY3"/>
-              </a:cxn>
-              <a:cxn ang="0">
-                <a:pos x="connsiteX4" y="connsiteY4"/>
-              </a:cxn>
-              <a:cxn ang="0">
-                <a:pos x="connsiteX5" y="connsiteY5"/>
-              </a:cxn>
-              <a:cxn ang="0">
-                <a:pos x="connsiteX6" y="connsiteY6"/>
-              </a:cxn>
-              <a:cxn ang="0">
-                <a:pos x="connsiteX7" y="connsiteY7"/>
-              </a:cxn>
-              <a:cxn ang="0">
-                <a:pos x="connsiteX8" y="connsiteY8"/>
-              </a:cxn>
-              <a:cxn ang="0">
-                <a:pos x="connsiteX9" y="connsiteY9"/>
-              </a:cxn>
-            </a:cxnLst>
-            <a:rect l="l" t="t" r="r" b="b"/>
-            <a:pathLst>
-              <a:path w="4403709" h="6858001">
-                <a:moveTo>
-                  <a:pt x="3223890" y="6858001"/>
-                </a:moveTo>
-                <a:lnTo>
-                  <a:pt x="4101908" y="6858001"/>
-                </a:lnTo>
-                <a:lnTo>
-                  <a:pt x="3254950" y="1599356"/>
-                </a:lnTo>
-                <a:lnTo>
-                  <a:pt x="3254950" y="1594062"/>
-                </a:lnTo>
-                <a:lnTo>
-                  <a:pt x="4403709" y="0"/>
-                </a:lnTo>
-                <a:lnTo>
-                  <a:pt x="3254950" y="0"/>
-                </a:lnTo>
-                <a:lnTo>
-                  <a:pt x="2903520" y="0"/>
-                </a:lnTo>
-                <a:lnTo>
-                  <a:pt x="0" y="0"/>
-                </a:lnTo>
-                <a:lnTo>
-                  <a:pt x="0" y="6858000"/>
-                </a:lnTo>
-                <a:lnTo>
-                  <a:pt x="3223890" y="6858000"/>
-                </a:lnTo>
-                <a:close/>
-              </a:path>
-            </a:pathLst>
-          </a:custGeom>
-          <a:ln>
-            <a:noFill/>
-          </a:ln>
-        </p:spPr>
-        <p:style>
-          <a:lnRef idx="2">
-            <a:schemeClr val="accent1">
-              <a:shade val="50000"/>
-            </a:schemeClr>
-          </a:lnRef>
-          <a:fillRef idx="1002">
-            <a:schemeClr val="dk1"/>
-          </a:fillRef>
-          <a:effectRef idx="0">
-            <a:schemeClr val="accent1"/>
-          </a:effectRef>
-          <a:fontRef idx="minor">
-            <a:schemeClr val="lt1"/>
-          </a:fontRef>
-        </p:style>
-        <p:txBody>
-          <a:bodyPr rtlCol="0" anchor="ctr"/>
-          <a:lstStyle/>
-          <a:p>
-            <a:pPr marL="0" marR="0" lvl="0" indent="0" algn="ctr" defTabSz="457200" rtl="0" eaLnBrk="1" fontAlgn="auto" latinLnBrk="0" hangingPunct="1">
-              <a:lnSpc>
-                <a:spcPct val="100000"/>
-              </a:lnSpc>
-              <a:spcBef>
-                <a:spcPts val="0"/>
-              </a:spcBef>
-              <a:spcAft>
-                <a:spcPts val="0"/>
-              </a:spcAft>
-              <a:buClrTx/>
-              <a:buSzTx/>
-              <a:buFontTx/>
-              <a:buNone/>
-              <a:tabLst/>
-              <a:defRPr/>
-            </a:pPr>
-            <a:endParaRPr kumimoji="0" lang="en-US" sz="1800" b="0" i="0" u="none" strike="noStrike" kern="1200" cap="none" spc="0" normalizeH="0" baseline="0" noProof="0">
-              <a:ln>
-                <a:noFill/>
-              </a:ln>
-              <a:solidFill>
-                <a:prstClr val="black"/>
-              </a:solidFill>
-              <a:effectLst/>
-              <a:uLnTx/>
-              <a:uFillTx/>
-              <a:latin typeface="Calibri" panose="020F0502020204030204"/>
-              <a:ea typeface="+mn-ea"/>
-              <a:cs typeface="+mn-cs"/>
-            </a:endParaRPr>
-          </a:p>
-        </p:txBody>
-      </p:sp>
-      <p:grpSp>
-        <p:nvGrpSpPr>
-          <p:cNvPr id="59" name="Group 58">
-            <a:extLst>
-              <a:ext uri="{FF2B5EF4-FFF2-40B4-BE49-F238E27FC236}">
-                <a16:creationId xmlns:a16="http://schemas.microsoft.com/office/drawing/2014/main" id="{B57BDC17-F1B3-455F-BBF1-680AA1F25C06}"/>
-              </a:ext>
-              <a:ext uri="{C183D7F6-B498-43B3-948B-1728B52AA6E4}">
-                <adec:decorative xmlns:adec="http://schemas.microsoft.com/office/drawing/2017/decorative" val="1"/>
-              </a:ext>
-            </a:extLst>
-          </p:cNvPr>
-          <p:cNvGrpSpPr>
-            <a:grpSpLocks noGrp="1" noUngrp="1" noRot="1" noChangeAspect="1" noMove="1" noResize="1"/>
-          </p:cNvGrpSpPr>
-          <p:nvPr>
-            <p:extLst>
-              <p:ext uri="{386F3935-93C4-4BCD-93E2-E3B085C9AB24}">
-                <p16:designElem xmlns:p16="http://schemas.microsoft.com/office/powerpoint/2015/main" val="1"/>
-              </p:ext>
-            </p:extLst>
-          </p:nvPr>
-        </p:nvGrpSpPr>
-        <p:grpSpPr>
-          <a:xfrm>
-            <a:off x="3315292" y="0"/>
-            <a:ext cx="2436813" cy="6858001"/>
-            <a:chOff x="1320800" y="0"/>
-            <a:chExt cx="2436813" cy="6858001"/>
-          </a:xfrm>
-        </p:grpSpPr>
-        <p:sp>
-          <p:nvSpPr>
-            <p:cNvPr id="60" name="Freeform 6">
-              <a:extLst>
-                <a:ext uri="{FF2B5EF4-FFF2-40B4-BE49-F238E27FC236}">
-                  <a16:creationId xmlns:a16="http://schemas.microsoft.com/office/drawing/2014/main" id="{64E2FA9A-FEF7-4501-B0EB-5E45EDD2177A}"/>
-                </a:ext>
-                <a:ext uri="{C183D7F6-B498-43B3-948B-1728B52AA6E4}">
-                  <adec:decorative xmlns:adec="http://schemas.microsoft.com/office/drawing/2017/decorative" val="1"/>
-                </a:ext>
-              </a:extLst>
-            </p:cNvPr>
-            <p:cNvSpPr/>
-            <p:nvPr>
-              <p:extLst>
-                <p:ext uri="{386F3935-93C4-4BCD-93E2-E3B085C9AB24}">
-                  <p16:designElem xmlns:p16="http://schemas.microsoft.com/office/powerpoint/2015/main" val="1"/>
-                </p:ext>
-              </p:extLst>
-            </p:nvPr>
-          </p:nvSpPr>
-          <p:spPr bwMode="auto">
-            <a:xfrm>
-              <a:off x="1627188" y="0"/>
-              <a:ext cx="1122363" cy="5329238"/>
-            </a:xfrm>
-            <a:custGeom>
-              <a:avLst/>
-              <a:gdLst/>
-              <a:ahLst/>
-              <a:cxnLst/>
-              <a:rect l="0" t="0" r="r" b="b"/>
-              <a:pathLst>
-                <a:path w="707" h="3357">
-                  <a:moveTo>
-                    <a:pt x="0" y="3330"/>
-                  </a:moveTo>
-                  <a:lnTo>
-                    <a:pt x="156" y="3357"/>
-                  </a:lnTo>
-                  <a:lnTo>
-                    <a:pt x="707" y="0"/>
-                  </a:lnTo>
-                  <a:lnTo>
-                    <a:pt x="547" y="0"/>
-                  </a:lnTo>
-                  <a:lnTo>
-                    <a:pt x="0" y="3330"/>
-                  </a:lnTo>
-                  <a:close/>
-                </a:path>
-              </a:pathLst>
-            </a:custGeom>
-            <a:solidFill>
-              <a:schemeClr val="accent1"/>
-            </a:solidFill>
-            <a:ln>
-              <a:noFill/>
-            </a:ln>
-          </p:spPr>
-        </p:sp>
-        <p:sp>
-          <p:nvSpPr>
-            <p:cNvPr id="61" name="Freeform 7">
-              <a:extLst>
-                <a:ext uri="{FF2B5EF4-FFF2-40B4-BE49-F238E27FC236}">
-                  <a16:creationId xmlns:a16="http://schemas.microsoft.com/office/drawing/2014/main" id="{BC38192B-B4CB-47D4-A3B1-10010247F158}"/>
-                </a:ext>
-                <a:ext uri="{C183D7F6-B498-43B3-948B-1728B52AA6E4}">
-                  <adec:decorative xmlns:adec="http://schemas.microsoft.com/office/drawing/2017/decorative" val="1"/>
-                </a:ext>
-              </a:extLst>
-            </p:cNvPr>
-            <p:cNvSpPr/>
-            <p:nvPr>
-              <p:extLst>
-                <p:ext uri="{386F3935-93C4-4BCD-93E2-E3B085C9AB24}">
-                  <p16:designElem xmlns:p16="http://schemas.microsoft.com/office/powerpoint/2015/main" val="1"/>
-                </p:ext>
-              </p:extLst>
-            </p:nvPr>
-          </p:nvSpPr>
-          <p:spPr bwMode="auto">
-            <a:xfrm>
-              <a:off x="1320800" y="0"/>
-              <a:ext cx="1117600" cy="5276850"/>
-            </a:xfrm>
-            <a:custGeom>
-              <a:avLst/>
-              <a:gdLst/>
-              <a:ahLst/>
-              <a:cxnLst/>
-              <a:rect l="0" t="0" r="r" b="b"/>
-              <a:pathLst>
-                <a:path w="704" h="3324">
-                  <a:moveTo>
-                    <a:pt x="704" y="0"/>
-                  </a:moveTo>
-                  <a:lnTo>
-                    <a:pt x="545" y="0"/>
-                  </a:lnTo>
-                  <a:lnTo>
-                    <a:pt x="0" y="3300"/>
-                  </a:lnTo>
-                  <a:lnTo>
-                    <a:pt x="157" y="3324"/>
-                  </a:lnTo>
-                  <a:lnTo>
-                    <a:pt x="704" y="0"/>
-                  </a:lnTo>
-                  <a:close/>
-                </a:path>
-              </a:pathLst>
-            </a:custGeom>
-            <a:solidFill>
-              <a:srgbClr val="595959"/>
-            </a:solidFill>
-            <a:ln>
-              <a:noFill/>
-            </a:ln>
-          </p:spPr>
-        </p:sp>
-        <p:sp>
-          <p:nvSpPr>
-            <p:cNvPr id="62" name="Freeform 8">
-              <a:extLst>
-                <a:ext uri="{FF2B5EF4-FFF2-40B4-BE49-F238E27FC236}">
-                  <a16:creationId xmlns:a16="http://schemas.microsoft.com/office/drawing/2014/main" id="{96330E33-E171-4B0F-82B5-AF7230399B5C}"/>
-                </a:ext>
-                <a:ext uri="{C183D7F6-B498-43B3-948B-1728B52AA6E4}">
-                  <adec:decorative xmlns:adec="http://schemas.microsoft.com/office/drawing/2017/decorative" val="1"/>
-                </a:ext>
-              </a:extLst>
-            </p:cNvPr>
-            <p:cNvSpPr/>
-            <p:nvPr>
-              <p:extLst>
-                <p:ext uri="{386F3935-93C4-4BCD-93E2-E3B085C9AB24}">
-                  <p16:designElem xmlns:p16="http://schemas.microsoft.com/office/powerpoint/2015/main" val="1"/>
-                </p:ext>
-              </p:extLst>
-            </p:nvPr>
-          </p:nvSpPr>
-          <p:spPr bwMode="auto">
-            <a:xfrm>
-              <a:off x="1320800" y="5238750"/>
-              <a:ext cx="1228725" cy="1619250"/>
-            </a:xfrm>
-            <a:custGeom>
-              <a:avLst/>
-              <a:gdLst/>
-              <a:ahLst/>
-              <a:cxnLst/>
-              <a:rect l="0" t="0" r="r" b="b"/>
-              <a:pathLst>
-                <a:path w="774" h="1020">
-                  <a:moveTo>
-                    <a:pt x="0" y="0"/>
-                  </a:moveTo>
-                  <a:lnTo>
-                    <a:pt x="740" y="1020"/>
-                  </a:lnTo>
-                  <a:lnTo>
-                    <a:pt x="774" y="1020"/>
-                  </a:lnTo>
-                  <a:lnTo>
-                    <a:pt x="0" y="0"/>
-                  </a:lnTo>
-                  <a:close/>
-                </a:path>
-              </a:pathLst>
-            </a:custGeom>
-            <a:solidFill>
-              <a:srgbClr val="262626"/>
-            </a:solidFill>
-            <a:ln>
-              <a:noFill/>
-            </a:ln>
-          </p:spPr>
-        </p:sp>
-        <p:sp>
-          <p:nvSpPr>
-            <p:cNvPr id="63" name="Freeform 9">
-              <a:extLst>
-                <a:ext uri="{FF2B5EF4-FFF2-40B4-BE49-F238E27FC236}">
-                  <a16:creationId xmlns:a16="http://schemas.microsoft.com/office/drawing/2014/main" id="{332B1723-69BF-42D7-B757-0FA059E15256}"/>
-                </a:ext>
-                <a:ext uri="{C183D7F6-B498-43B3-948B-1728B52AA6E4}">
-                  <adec:decorative xmlns:adec="http://schemas.microsoft.com/office/drawing/2017/decorative" val="1"/>
-                </a:ext>
-              </a:extLst>
-            </p:cNvPr>
-            <p:cNvSpPr/>
-            <p:nvPr>
-              <p:extLst>
-                <p:ext uri="{386F3935-93C4-4BCD-93E2-E3B085C9AB24}">
-                  <p16:designElem xmlns:p16="http://schemas.microsoft.com/office/powerpoint/2015/main" val="1"/>
-                </p:ext>
-              </p:extLst>
-            </p:nvPr>
-          </p:nvSpPr>
-          <p:spPr bwMode="auto">
-            <a:xfrm>
-              <a:off x="1627188" y="5291138"/>
-              <a:ext cx="1495425" cy="1566863"/>
-            </a:xfrm>
-            <a:custGeom>
-              <a:avLst/>
-              <a:gdLst/>
-              <a:ahLst/>
-              <a:cxnLst/>
-              <a:rect l="0" t="0" r="r" b="b"/>
-              <a:pathLst>
-                <a:path w="942" h="987">
-                  <a:moveTo>
-                    <a:pt x="0" y="0"/>
-                  </a:moveTo>
-                  <a:lnTo>
-                    <a:pt x="909" y="987"/>
-                  </a:lnTo>
-                  <a:lnTo>
-                    <a:pt x="942" y="987"/>
-                  </a:lnTo>
-                  <a:lnTo>
-                    <a:pt x="0" y="0"/>
-                  </a:lnTo>
-                  <a:close/>
-                </a:path>
-              </a:pathLst>
-            </a:custGeom>
-            <a:solidFill>
-              <a:schemeClr val="accent1">
-                <a:lumMod val="50000"/>
-              </a:schemeClr>
-            </a:solidFill>
-            <a:ln>
-              <a:noFill/>
-            </a:ln>
-          </p:spPr>
-        </p:sp>
-        <p:sp>
-          <p:nvSpPr>
-            <p:cNvPr id="64" name="Freeform 10">
-              <a:extLst>
-                <a:ext uri="{FF2B5EF4-FFF2-40B4-BE49-F238E27FC236}">
-                  <a16:creationId xmlns:a16="http://schemas.microsoft.com/office/drawing/2014/main" id="{F115D62D-1E96-48D1-A78D-D370A0BFB9B5}"/>
-                </a:ext>
-                <a:ext uri="{C183D7F6-B498-43B3-948B-1728B52AA6E4}">
-                  <adec:decorative xmlns:adec="http://schemas.microsoft.com/office/drawing/2017/decorative" val="1"/>
-                </a:ext>
-              </a:extLst>
-            </p:cNvPr>
-            <p:cNvSpPr/>
-            <p:nvPr>
-              <p:extLst>
-                <p:ext uri="{386F3935-93C4-4BCD-93E2-E3B085C9AB24}">
-                  <p16:designElem xmlns:p16="http://schemas.microsoft.com/office/powerpoint/2015/main" val="1"/>
-                </p:ext>
-              </p:extLst>
-            </p:nvPr>
-          </p:nvSpPr>
-          <p:spPr bwMode="auto">
-            <a:xfrm>
-              <a:off x="1627188" y="5286375"/>
-              <a:ext cx="2130425" cy="1571625"/>
-            </a:xfrm>
-            <a:custGeom>
-              <a:avLst/>
-              <a:gdLst/>
-              <a:ahLst/>
-              <a:cxnLst/>
-              <a:rect l="0" t="0" r="r" b="b"/>
-              <a:pathLst>
-                <a:path w="1342" h="990">
-                  <a:moveTo>
-                    <a:pt x="0" y="3"/>
-                  </a:moveTo>
-                  <a:lnTo>
-                    <a:pt x="942" y="990"/>
-                  </a:lnTo>
-                  <a:lnTo>
-                    <a:pt x="1342" y="990"/>
-                  </a:lnTo>
-                  <a:lnTo>
-                    <a:pt x="156" y="27"/>
-                  </a:lnTo>
-                  <a:lnTo>
-                    <a:pt x="0" y="0"/>
-                  </a:lnTo>
-                  <a:lnTo>
-                    <a:pt x="0" y="3"/>
-                  </a:lnTo>
-                  <a:close/>
-                </a:path>
-              </a:pathLst>
-            </a:custGeom>
-            <a:solidFill>
-              <a:schemeClr val="accent1">
-                <a:lumMod val="75000"/>
-              </a:schemeClr>
-            </a:solidFill>
-            <a:ln>
-              <a:noFill/>
-            </a:ln>
-          </p:spPr>
-        </p:sp>
-        <p:sp>
-          <p:nvSpPr>
-            <p:cNvPr id="65" name="Freeform 11">
-              <a:extLst>
-                <a:ext uri="{FF2B5EF4-FFF2-40B4-BE49-F238E27FC236}">
-                  <a16:creationId xmlns:a16="http://schemas.microsoft.com/office/drawing/2014/main" id="{91C2876A-169D-4822-A766-C00578C88B4B}"/>
-                </a:ext>
-                <a:ext uri="{C183D7F6-B498-43B3-948B-1728B52AA6E4}">
-                  <adec:decorative xmlns:adec="http://schemas.microsoft.com/office/drawing/2017/decorative" val="1"/>
-                </a:ext>
-              </a:extLst>
-            </p:cNvPr>
-            <p:cNvSpPr/>
-            <p:nvPr>
-              <p:extLst>
-                <p:ext uri="{386F3935-93C4-4BCD-93E2-E3B085C9AB24}">
-                  <p16:designElem xmlns:p16="http://schemas.microsoft.com/office/powerpoint/2015/main" val="1"/>
-                </p:ext>
-              </p:extLst>
-            </p:nvPr>
-          </p:nvSpPr>
-          <p:spPr bwMode="auto">
-            <a:xfrm>
-              <a:off x="1320800" y="5238750"/>
-              <a:ext cx="1695450" cy="1619250"/>
-            </a:xfrm>
-            <a:custGeom>
-              <a:avLst/>
-              <a:gdLst/>
-              <a:ahLst/>
-              <a:cxnLst/>
-              <a:rect l="0" t="0" r="r" b="b"/>
-              <a:pathLst>
-                <a:path w="1068" h="1020">
-                  <a:moveTo>
-                    <a:pt x="1068" y="1020"/>
-                  </a:moveTo>
-                  <a:lnTo>
-                    <a:pt x="184" y="60"/>
-                  </a:lnTo>
-                  <a:lnTo>
-                    <a:pt x="154" y="27"/>
-                  </a:lnTo>
-                  <a:lnTo>
-                    <a:pt x="157" y="27"/>
-                  </a:lnTo>
-                  <a:lnTo>
-                    <a:pt x="157" y="24"/>
-                  </a:lnTo>
-                  <a:lnTo>
-                    <a:pt x="154" y="24"/>
-                  </a:lnTo>
-                  <a:lnTo>
-                    <a:pt x="0" y="0"/>
-                  </a:lnTo>
-                  <a:lnTo>
-                    <a:pt x="0" y="0"/>
-                  </a:lnTo>
-                  <a:lnTo>
-                    <a:pt x="774" y="1020"/>
-                  </a:lnTo>
-                  <a:lnTo>
-                    <a:pt x="1068" y="1020"/>
-                  </a:lnTo>
-                  <a:close/>
-                </a:path>
-              </a:pathLst>
-            </a:custGeom>
-            <a:solidFill>
-              <a:srgbClr val="404040"/>
-            </a:solidFill>
-            <a:ln>
-              <a:noFill/>
-            </a:ln>
-          </p:spPr>
-        </p:sp>
-      </p:grpSp>
-      <p:sp>
-        <p:nvSpPr>
-          <p:cNvPr id="2" name="Title 1">
-            <a:extLst>
-              <a:ext uri="{FF2B5EF4-FFF2-40B4-BE49-F238E27FC236}">
-                <a16:creationId xmlns:a16="http://schemas.microsoft.com/office/drawing/2014/main" id="{1CA0DC98-7FC3-4A14-A544-240B5E5EABD6}"/>
-              </a:ext>
-            </a:extLst>
-          </p:cNvPr>
-          <p:cNvSpPr>
-            <a:spLocks noGrp="1"/>
-          </p:cNvSpPr>
-          <p:nvPr>
-            <p:ph type="title"/>
-          </p:nvPr>
-        </p:nvSpPr>
-        <p:spPr>
-          <a:xfrm>
-            <a:off x="535020" y="685800"/>
-            <a:ext cx="2780271" cy="5105400"/>
-          </a:xfrm>
-        </p:spPr>
-        <p:txBody>
-          <a:bodyPr>
-            <a:normAutofit/>
-          </a:bodyPr>
-          <a:lstStyle/>
-          <a:p>
-            <a:r>
-              <a:rPr lang="en-US" sz="4000" b="1">
-                <a:solidFill>
-                  <a:srgbClr val="FFFFFF"/>
-                </a:solidFill>
-              </a:rPr>
-              <a:t>Julia Packages</a:t>
-            </a:r>
-            <a:endParaRPr lang="en-US" sz="4000" b="1" dirty="0">
-              <a:solidFill>
-                <a:srgbClr val="FFFFFF"/>
-              </a:solidFill>
-            </a:endParaRPr>
-          </a:p>
-        </p:txBody>
-      </p:sp>
-      <p:graphicFrame>
-        <p:nvGraphicFramePr>
-          <p:cNvPr id="5" name="Content Placeholder 2">
-            <a:extLst>
-              <a:ext uri="{FF2B5EF4-FFF2-40B4-BE49-F238E27FC236}">
-                <a16:creationId xmlns:a16="http://schemas.microsoft.com/office/drawing/2014/main" id="{68ECC266-E380-45C2-9FD1-4C24BB84C0E4}"/>
-              </a:ext>
-            </a:extLst>
-          </p:cNvPr>
-          <p:cNvGraphicFramePr>
-            <a:graphicFrameLocks noGrp="1"/>
-          </p:cNvGraphicFramePr>
-          <p:nvPr>
-            <p:ph idx="1"/>
-            <p:extLst>
-              <p:ext uri="{D42A27DB-BD31-4B8C-83A1-F6EECF244321}">
-                <p14:modId xmlns:p14="http://schemas.microsoft.com/office/powerpoint/2010/main" val="67979969"/>
-              </p:ext>
-            </p:extLst>
-          </p:nvPr>
-        </p:nvGraphicFramePr>
-        <p:xfrm>
-          <a:off x="4685506" y="685800"/>
-          <a:ext cx="7142163" cy="5105400"/>
-        </p:xfrm>
-        <a:graphic>
-          <a:graphicData uri="http://schemas.openxmlformats.org/drawingml/2006/diagram">
-            <dgm:relIds xmlns:dgm="http://schemas.openxmlformats.org/drawingml/2006/diagram" xmlns:r="http://schemas.openxmlformats.org/officeDocument/2006/relationships" r:dm="rId2" r:lo="rId3" r:qs="rId4" r:cs="rId5"/>
-          </a:graphicData>
-        </a:graphic>
-      </p:graphicFrame>
-    </p:spTree>
-    <p:extLst>
-      <p:ext uri="{BB962C8B-B14F-4D97-AF65-F5344CB8AC3E}">
-        <p14:creationId xmlns:p14="http://schemas.microsoft.com/office/powerpoint/2010/main" val="421828086"/>
-      </p:ext>
-    </p:extLst>
-  </p:cSld>
-  <p:clrMapOvr>
-    <a:masterClrMapping/>
-  </p:clrMapOvr>
-</p:sld>
-</file>
-
 <file path=ppt/slides/slide2.xml><?xml version="1.0" encoding="utf-8"?>
 <p:sld xmlns:a="http://schemas.openxmlformats.org/drawingml/2006/main" xmlns:r="http://schemas.openxmlformats.org/officeDocument/2006/relationships" xmlns:p="http://schemas.openxmlformats.org/presentationml/2006/main">
   <p:cSld>

</xml_diff>